<commit_message>
Update DSA.pptx presentation file
Replaced the existing Data Structure & Algorithm presentation with a new version. The updated file may include revised content or corrections.
</commit_message>
<xml_diff>
--- a/Data Structure & Algorithm PDF/DSA.pptx
+++ b/Data Structure & Algorithm PDF/DSA.pptx
@@ -10,7 +10,7 @@
     <p:sldId id="258" r:id="rId4"/>
     <p:sldId id="259" r:id="rId5"/>
     <p:sldId id="260" r:id="rId6"/>
-    <p:sldId id="261" r:id="rId7"/>
+    <p:sldId id="268" r:id="rId7"/>
     <p:sldId id="262" r:id="rId8"/>
     <p:sldId id="263" r:id="rId9"/>
     <p:sldId id="265" r:id="rId10"/>
@@ -122,6 +122,2888 @@
 </p:presentation>
 </file>
 
+<file path=ppt/diagrams/colors1.xml><?xml version="1.0" encoding="utf-8"?>
+<dgm:colorsDef xmlns:dgm="http://schemas.openxmlformats.org/drawingml/2006/diagram" xmlns:a="http://schemas.openxmlformats.org/drawingml/2006/main" uniqueId="urn:microsoft.com/office/officeart/2005/8/colors/colorful2">
+  <dgm:title val=""/>
+  <dgm:desc val=""/>
+  <dgm:catLst>
+    <dgm:cat type="colorful" pri="10200"/>
+  </dgm:catLst>
+  <dgm:styleLbl name="node0">
+    <dgm:fillClrLst meth="repeat">
+      <a:schemeClr val="accent1"/>
+    </dgm:fillClrLst>
+    <dgm:linClrLst meth="repeat">
+      <a:schemeClr val="lt1"/>
+    </dgm:linClrLst>
+    <dgm:effectClrLst/>
+    <dgm:txLinClrLst/>
+    <dgm:txFillClrLst/>
+    <dgm:txEffectClrLst/>
+  </dgm:styleLbl>
+  <dgm:styleLbl name="node1">
+    <dgm:fillClrLst>
+      <a:schemeClr val="accent2"/>
+      <a:schemeClr val="accent3"/>
+    </dgm:fillClrLst>
+    <dgm:linClrLst meth="repeat">
+      <a:schemeClr val="lt1"/>
+    </dgm:linClrLst>
+    <dgm:effectClrLst/>
+    <dgm:txLinClrLst/>
+    <dgm:txFillClrLst/>
+    <dgm:txEffectClrLst/>
+  </dgm:styleLbl>
+  <dgm:styleLbl name="alignNode1">
+    <dgm:fillClrLst>
+      <a:schemeClr val="accent2"/>
+      <a:schemeClr val="accent3"/>
+    </dgm:fillClrLst>
+    <dgm:linClrLst>
+      <a:schemeClr val="accent2"/>
+      <a:schemeClr val="accent3"/>
+    </dgm:linClrLst>
+    <dgm:effectClrLst/>
+    <dgm:txLinClrLst/>
+    <dgm:txFillClrLst/>
+    <dgm:txEffectClrLst/>
+  </dgm:styleLbl>
+  <dgm:styleLbl name="lnNode1">
+    <dgm:fillClrLst>
+      <a:schemeClr val="accent2"/>
+      <a:schemeClr val="accent3"/>
+    </dgm:fillClrLst>
+    <dgm:linClrLst meth="repeat">
+      <a:schemeClr val="lt1"/>
+    </dgm:linClrLst>
+    <dgm:effectClrLst/>
+    <dgm:txLinClrLst/>
+    <dgm:txFillClrLst/>
+    <dgm:txEffectClrLst/>
+  </dgm:styleLbl>
+  <dgm:styleLbl name="vennNode1">
+    <dgm:fillClrLst>
+      <a:schemeClr val="accent2">
+        <a:alpha val="50000"/>
+      </a:schemeClr>
+      <a:schemeClr val="accent3">
+        <a:alpha val="50000"/>
+      </a:schemeClr>
+    </dgm:fillClrLst>
+    <dgm:linClrLst meth="repeat">
+      <a:schemeClr val="lt1"/>
+    </dgm:linClrLst>
+    <dgm:effectClrLst/>
+    <dgm:txLinClrLst/>
+    <dgm:txFillClrLst/>
+    <dgm:txEffectClrLst/>
+  </dgm:styleLbl>
+  <dgm:styleLbl name="node2">
+    <dgm:fillClrLst>
+      <a:schemeClr val="accent3"/>
+    </dgm:fillClrLst>
+    <dgm:linClrLst meth="repeat">
+      <a:schemeClr val="lt1"/>
+    </dgm:linClrLst>
+    <dgm:effectClrLst/>
+    <dgm:txLinClrLst/>
+    <dgm:txFillClrLst/>
+    <dgm:txEffectClrLst/>
+  </dgm:styleLbl>
+  <dgm:styleLbl name="node3">
+    <dgm:fillClrLst>
+      <a:schemeClr val="accent4"/>
+    </dgm:fillClrLst>
+    <dgm:linClrLst meth="repeat">
+      <a:schemeClr val="lt1"/>
+    </dgm:linClrLst>
+    <dgm:effectClrLst/>
+    <dgm:txLinClrLst/>
+    <dgm:txFillClrLst/>
+    <dgm:txEffectClrLst/>
+  </dgm:styleLbl>
+  <dgm:styleLbl name="node4">
+    <dgm:fillClrLst>
+      <a:schemeClr val="accent5"/>
+    </dgm:fillClrLst>
+    <dgm:linClrLst meth="repeat">
+      <a:schemeClr val="lt1"/>
+    </dgm:linClrLst>
+    <dgm:effectClrLst/>
+    <dgm:txLinClrLst/>
+    <dgm:txFillClrLst/>
+    <dgm:txEffectClrLst/>
+  </dgm:styleLbl>
+  <dgm:styleLbl name="fgImgPlace1">
+    <dgm:fillClrLst>
+      <a:schemeClr val="accent2">
+        <a:tint val="50000"/>
+      </a:schemeClr>
+      <a:schemeClr val="accent3">
+        <a:tint val="50000"/>
+      </a:schemeClr>
+    </dgm:fillClrLst>
+    <dgm:linClrLst meth="repeat">
+      <a:schemeClr val="lt1"/>
+    </dgm:linClrLst>
+    <dgm:effectClrLst/>
+    <dgm:txLinClrLst/>
+    <dgm:txFillClrLst meth="repeat">
+      <a:schemeClr val="lt1"/>
+    </dgm:txFillClrLst>
+    <dgm:txEffectClrLst/>
+  </dgm:styleLbl>
+  <dgm:styleLbl name="alignImgPlace1">
+    <dgm:fillClrLst>
+      <a:schemeClr val="accent2">
+        <a:tint val="50000"/>
+      </a:schemeClr>
+      <a:schemeClr val="accent3">
+        <a:tint val="20000"/>
+      </a:schemeClr>
+    </dgm:fillClrLst>
+    <dgm:linClrLst meth="repeat">
+      <a:schemeClr val="lt1"/>
+    </dgm:linClrLst>
+    <dgm:effectClrLst/>
+    <dgm:txLinClrLst/>
+    <dgm:txFillClrLst meth="repeat">
+      <a:schemeClr val="lt1"/>
+    </dgm:txFillClrLst>
+    <dgm:txEffectClrLst/>
+  </dgm:styleLbl>
+  <dgm:styleLbl name="bgImgPlace1">
+    <dgm:fillClrLst>
+      <a:schemeClr val="accent2">
+        <a:tint val="50000"/>
+      </a:schemeClr>
+      <a:schemeClr val="accent3">
+        <a:tint val="20000"/>
+      </a:schemeClr>
+    </dgm:fillClrLst>
+    <dgm:linClrLst meth="repeat">
+      <a:schemeClr val="lt1"/>
+    </dgm:linClrLst>
+    <dgm:effectClrLst/>
+    <dgm:txLinClrLst/>
+    <dgm:txFillClrLst meth="repeat">
+      <a:schemeClr val="lt1"/>
+    </dgm:txFillClrLst>
+    <dgm:txEffectClrLst/>
+  </dgm:styleLbl>
+  <dgm:styleLbl name="sibTrans2D1">
+    <dgm:fillClrLst>
+      <a:schemeClr val="accent2"/>
+      <a:schemeClr val="accent3"/>
+    </dgm:fillClrLst>
+    <dgm:linClrLst meth="repeat">
+      <a:schemeClr val="lt1"/>
+    </dgm:linClrLst>
+    <dgm:effectClrLst/>
+    <dgm:txLinClrLst/>
+    <dgm:txFillClrLst/>
+    <dgm:txEffectClrLst/>
+  </dgm:styleLbl>
+  <dgm:styleLbl name="fgSibTrans2D1">
+    <dgm:fillClrLst>
+      <a:schemeClr val="accent2"/>
+      <a:schemeClr val="accent3"/>
+    </dgm:fillClrLst>
+    <dgm:linClrLst meth="repeat">
+      <a:schemeClr val="lt1"/>
+    </dgm:linClrLst>
+    <dgm:effectClrLst/>
+    <dgm:txLinClrLst/>
+    <dgm:txFillClrLst meth="repeat">
+      <a:schemeClr val="lt1"/>
+    </dgm:txFillClrLst>
+    <dgm:txEffectClrLst/>
+  </dgm:styleLbl>
+  <dgm:styleLbl name="bgSibTrans2D1">
+    <dgm:fillClrLst>
+      <a:schemeClr val="accent2"/>
+      <a:schemeClr val="accent3"/>
+    </dgm:fillClrLst>
+    <dgm:linClrLst meth="repeat">
+      <a:schemeClr val="lt1"/>
+    </dgm:linClrLst>
+    <dgm:effectClrLst/>
+    <dgm:txLinClrLst/>
+    <dgm:txFillClrLst meth="repeat">
+      <a:schemeClr val="lt1"/>
+    </dgm:txFillClrLst>
+    <dgm:txEffectClrLst/>
+  </dgm:styleLbl>
+  <dgm:styleLbl name="sibTrans1D1">
+    <dgm:fillClrLst/>
+    <dgm:linClrLst>
+      <a:schemeClr val="accent2"/>
+      <a:schemeClr val="accent3"/>
+    </dgm:linClrLst>
+    <dgm:effectClrLst/>
+    <dgm:txLinClrLst/>
+    <dgm:txFillClrLst meth="repeat">
+      <a:schemeClr val="tx1"/>
+    </dgm:txFillClrLst>
+    <dgm:txEffectClrLst/>
+  </dgm:styleLbl>
+  <dgm:styleLbl name="callout">
+    <dgm:fillClrLst meth="repeat">
+      <a:schemeClr val="accent2"/>
+    </dgm:fillClrLst>
+    <dgm:linClrLst meth="repeat">
+      <a:schemeClr val="accent2">
+        <a:tint val="50000"/>
+      </a:schemeClr>
+    </dgm:linClrLst>
+    <dgm:effectClrLst/>
+    <dgm:txLinClrLst/>
+    <dgm:txFillClrLst meth="repeat">
+      <a:schemeClr val="tx1"/>
+    </dgm:txFillClrLst>
+    <dgm:txEffectClrLst/>
+  </dgm:styleLbl>
+  <dgm:styleLbl name="asst0">
+    <dgm:fillClrLst meth="repeat">
+      <a:schemeClr val="accent2"/>
+    </dgm:fillClrLst>
+    <dgm:linClrLst meth="repeat">
+      <a:schemeClr val="lt1">
+        <a:shade val="80000"/>
+      </a:schemeClr>
+    </dgm:linClrLst>
+    <dgm:effectClrLst/>
+    <dgm:txLinClrLst/>
+    <dgm:txFillClrLst/>
+    <dgm:txEffectClrLst/>
+  </dgm:styleLbl>
+  <dgm:styleLbl name="asst1">
+    <dgm:fillClrLst meth="repeat">
+      <a:schemeClr val="accent3"/>
+    </dgm:fillClrLst>
+    <dgm:linClrLst meth="repeat">
+      <a:schemeClr val="lt1">
+        <a:shade val="80000"/>
+      </a:schemeClr>
+    </dgm:linClrLst>
+    <dgm:effectClrLst/>
+    <dgm:txLinClrLst/>
+    <dgm:txFillClrLst/>
+    <dgm:txEffectClrLst/>
+  </dgm:styleLbl>
+  <dgm:styleLbl name="asst2">
+    <dgm:fillClrLst>
+      <a:schemeClr val="accent4"/>
+    </dgm:fillClrLst>
+    <dgm:linClrLst meth="repeat">
+      <a:schemeClr val="lt1"/>
+    </dgm:linClrLst>
+    <dgm:effectClrLst/>
+    <dgm:txLinClrLst/>
+    <dgm:txFillClrLst/>
+    <dgm:txEffectClrLst/>
+  </dgm:styleLbl>
+  <dgm:styleLbl name="asst3">
+    <dgm:fillClrLst>
+      <a:schemeClr val="accent5"/>
+    </dgm:fillClrLst>
+    <dgm:linClrLst meth="repeat">
+      <a:schemeClr val="lt1"/>
+    </dgm:linClrLst>
+    <dgm:effectClrLst/>
+    <dgm:txLinClrLst/>
+    <dgm:txFillClrLst/>
+    <dgm:txEffectClrLst/>
+  </dgm:styleLbl>
+  <dgm:styleLbl name="asst4">
+    <dgm:fillClrLst>
+      <a:schemeClr val="accent6"/>
+    </dgm:fillClrLst>
+    <dgm:linClrLst meth="repeat">
+      <a:schemeClr val="lt1"/>
+    </dgm:linClrLst>
+    <dgm:effectClrLst/>
+    <dgm:txLinClrLst/>
+    <dgm:txFillClrLst/>
+    <dgm:txEffectClrLst/>
+  </dgm:styleLbl>
+  <dgm:styleLbl name="parChTrans2D1">
+    <dgm:fillClrLst meth="repeat">
+      <a:schemeClr val="accent2"/>
+    </dgm:fillClrLst>
+    <dgm:linClrLst meth="repeat">
+      <a:schemeClr val="lt1"/>
+    </dgm:linClrLst>
+    <dgm:effectClrLst/>
+    <dgm:txLinClrLst/>
+    <dgm:txFillClrLst meth="repeat">
+      <a:schemeClr val="lt1"/>
+    </dgm:txFillClrLst>
+    <dgm:txEffectClrLst/>
+  </dgm:styleLbl>
+  <dgm:styleLbl name="parChTrans2D2">
+    <dgm:fillClrLst meth="repeat">
+      <a:schemeClr val="accent3"/>
+    </dgm:fillClrLst>
+    <dgm:linClrLst meth="repeat">
+      <a:schemeClr val="lt1"/>
+    </dgm:linClrLst>
+    <dgm:effectClrLst/>
+    <dgm:txLinClrLst/>
+    <dgm:txFillClrLst/>
+    <dgm:txEffectClrLst/>
+  </dgm:styleLbl>
+  <dgm:styleLbl name="parChTrans2D3">
+    <dgm:fillClrLst meth="repeat">
+      <a:schemeClr val="accent4"/>
+    </dgm:fillClrLst>
+    <dgm:linClrLst meth="repeat">
+      <a:schemeClr val="lt1"/>
+    </dgm:linClrLst>
+    <dgm:effectClrLst/>
+    <dgm:txLinClrLst/>
+    <dgm:txFillClrLst/>
+    <dgm:txEffectClrLst/>
+  </dgm:styleLbl>
+  <dgm:styleLbl name="parChTrans2D4">
+    <dgm:fillClrLst meth="repeat">
+      <a:schemeClr val="accent5"/>
+    </dgm:fillClrLst>
+    <dgm:linClrLst meth="repeat">
+      <a:schemeClr val="lt1"/>
+    </dgm:linClrLst>
+    <dgm:effectClrLst/>
+    <dgm:txLinClrLst/>
+    <dgm:txFillClrLst meth="repeat">
+      <a:schemeClr val="lt1"/>
+    </dgm:txFillClrLst>
+    <dgm:txEffectClrLst/>
+  </dgm:styleLbl>
+  <dgm:styleLbl name="parChTrans1D1">
+    <dgm:fillClrLst meth="repeat">
+      <a:schemeClr val="accent2"/>
+    </dgm:fillClrLst>
+    <dgm:linClrLst meth="repeat">
+      <a:schemeClr val="accent2"/>
+    </dgm:linClrLst>
+    <dgm:effectClrLst/>
+    <dgm:txLinClrLst/>
+    <dgm:txFillClrLst meth="repeat">
+      <a:schemeClr val="tx1"/>
+    </dgm:txFillClrLst>
+    <dgm:txEffectClrLst/>
+  </dgm:styleLbl>
+  <dgm:styleLbl name="parChTrans1D2">
+    <dgm:fillClrLst meth="repeat">
+      <a:schemeClr val="accent2">
+        <a:tint val="90000"/>
+      </a:schemeClr>
+    </dgm:fillClrLst>
+    <dgm:linClrLst meth="repeat">
+      <a:schemeClr val="accent3"/>
+    </dgm:linClrLst>
+    <dgm:effectClrLst/>
+    <dgm:txLinClrLst/>
+    <dgm:txFillClrLst meth="repeat">
+      <a:schemeClr val="tx1"/>
+    </dgm:txFillClrLst>
+    <dgm:txEffectClrLst/>
+  </dgm:styleLbl>
+  <dgm:styleLbl name="parChTrans1D3">
+    <dgm:fillClrLst meth="repeat">
+      <a:schemeClr val="accent2">
+        <a:tint val="70000"/>
+      </a:schemeClr>
+    </dgm:fillClrLst>
+    <dgm:linClrLst meth="repeat">
+      <a:schemeClr val="accent4"/>
+    </dgm:linClrLst>
+    <dgm:effectClrLst/>
+    <dgm:txLinClrLst/>
+    <dgm:txFillClrLst meth="repeat">
+      <a:schemeClr val="tx1"/>
+    </dgm:txFillClrLst>
+    <dgm:txEffectClrLst/>
+  </dgm:styleLbl>
+  <dgm:styleLbl name="parChTrans1D4">
+    <dgm:fillClrLst meth="repeat">
+      <a:schemeClr val="accent2">
+        <a:tint val="50000"/>
+      </a:schemeClr>
+    </dgm:fillClrLst>
+    <dgm:linClrLst meth="repeat">
+      <a:schemeClr val="accent5"/>
+    </dgm:linClrLst>
+    <dgm:effectClrLst/>
+    <dgm:txLinClrLst/>
+    <dgm:txFillClrLst meth="repeat">
+      <a:schemeClr val="tx1"/>
+    </dgm:txFillClrLst>
+    <dgm:txEffectClrLst/>
+  </dgm:styleLbl>
+  <dgm:styleLbl name="fgAcc1">
+    <dgm:fillClrLst meth="repeat">
+      <a:schemeClr val="lt1">
+        <a:alpha val="90000"/>
+      </a:schemeClr>
+    </dgm:fillClrLst>
+    <dgm:linClrLst>
+      <a:schemeClr val="accent2"/>
+      <a:schemeClr val="accent3"/>
+    </dgm:linClrLst>
+    <dgm:effectClrLst/>
+    <dgm:txLinClrLst/>
+    <dgm:txFillClrLst meth="repeat">
+      <a:schemeClr val="dk1"/>
+    </dgm:txFillClrLst>
+    <dgm:txEffectClrLst/>
+  </dgm:styleLbl>
+  <dgm:styleLbl name="conFgAcc1">
+    <dgm:fillClrLst meth="repeat">
+      <a:schemeClr val="lt1">
+        <a:alpha val="90000"/>
+      </a:schemeClr>
+    </dgm:fillClrLst>
+    <dgm:linClrLst>
+      <a:schemeClr val="accent2"/>
+      <a:schemeClr val="accent3"/>
+    </dgm:linClrLst>
+    <dgm:effectClrLst/>
+    <dgm:txLinClrLst/>
+    <dgm:txFillClrLst meth="repeat">
+      <a:schemeClr val="dk1"/>
+    </dgm:txFillClrLst>
+    <dgm:txEffectClrLst/>
+  </dgm:styleLbl>
+  <dgm:styleLbl name="alignAcc1">
+    <dgm:fillClrLst meth="repeat">
+      <a:schemeClr val="lt1">
+        <a:alpha val="90000"/>
+      </a:schemeClr>
+    </dgm:fillClrLst>
+    <dgm:linClrLst>
+      <a:schemeClr val="accent2"/>
+      <a:schemeClr val="accent3"/>
+    </dgm:linClrLst>
+    <dgm:effectClrLst/>
+    <dgm:txLinClrLst/>
+    <dgm:txFillClrLst meth="repeat">
+      <a:schemeClr val="dk1"/>
+    </dgm:txFillClrLst>
+    <dgm:txEffectClrLst/>
+  </dgm:styleLbl>
+  <dgm:styleLbl name="trAlignAcc1">
+    <dgm:fillClrLst meth="repeat">
+      <a:schemeClr val="lt1">
+        <a:alpha val="40000"/>
+      </a:schemeClr>
+    </dgm:fillClrLst>
+    <dgm:linClrLst meth="repeat">
+      <a:schemeClr val="accent2"/>
+    </dgm:linClrLst>
+    <dgm:effectClrLst/>
+    <dgm:txLinClrLst/>
+    <dgm:txFillClrLst meth="repeat">
+      <a:schemeClr val="dk1"/>
+    </dgm:txFillClrLst>
+    <dgm:txEffectClrLst/>
+  </dgm:styleLbl>
+  <dgm:styleLbl name="bgAcc1">
+    <dgm:fillClrLst meth="repeat">
+      <a:schemeClr val="lt1">
+        <a:alpha val="90000"/>
+      </a:schemeClr>
+    </dgm:fillClrLst>
+    <dgm:linClrLst>
+      <a:schemeClr val="accent2"/>
+      <a:schemeClr val="accent3"/>
+    </dgm:linClrLst>
+    <dgm:effectClrLst/>
+    <dgm:txLinClrLst/>
+    <dgm:txFillClrLst meth="repeat">
+      <a:schemeClr val="dk1"/>
+    </dgm:txFillClrLst>
+    <dgm:txEffectClrLst/>
+  </dgm:styleLbl>
+  <dgm:styleLbl name="solidFgAcc1">
+    <dgm:fillClrLst meth="repeat">
+      <a:schemeClr val="lt1"/>
+    </dgm:fillClrLst>
+    <dgm:linClrLst>
+      <a:schemeClr val="accent2"/>
+      <a:schemeClr val="accent3"/>
+    </dgm:linClrLst>
+    <dgm:effectClrLst/>
+    <dgm:txLinClrLst/>
+    <dgm:txFillClrLst meth="repeat">
+      <a:schemeClr val="dk1"/>
+    </dgm:txFillClrLst>
+    <dgm:txEffectClrLst/>
+  </dgm:styleLbl>
+  <dgm:styleLbl name="solidAlignAcc1">
+    <dgm:fillClrLst meth="repeat">
+      <a:schemeClr val="lt1"/>
+    </dgm:fillClrLst>
+    <dgm:linClrLst>
+      <a:schemeClr val="accent2"/>
+      <a:schemeClr val="accent3"/>
+    </dgm:linClrLst>
+    <dgm:effectClrLst/>
+    <dgm:txLinClrLst/>
+    <dgm:txFillClrLst meth="repeat">
+      <a:schemeClr val="dk1"/>
+    </dgm:txFillClrLst>
+    <dgm:txEffectClrLst/>
+  </dgm:styleLbl>
+  <dgm:styleLbl name="solidBgAcc1">
+    <dgm:fillClrLst meth="repeat">
+      <a:schemeClr val="lt1"/>
+    </dgm:fillClrLst>
+    <dgm:linClrLst>
+      <a:schemeClr val="accent2"/>
+      <a:schemeClr val="accent3"/>
+    </dgm:linClrLst>
+    <dgm:effectClrLst/>
+    <dgm:txLinClrLst/>
+    <dgm:txFillClrLst meth="repeat">
+      <a:schemeClr val="dk1"/>
+    </dgm:txFillClrLst>
+    <dgm:txEffectClrLst/>
+  </dgm:styleLbl>
+  <dgm:styleLbl name="fgAccFollowNode1">
+    <dgm:fillClrLst>
+      <a:schemeClr val="accent2">
+        <a:tint val="40000"/>
+        <a:alpha val="90000"/>
+      </a:schemeClr>
+      <a:schemeClr val="accent3">
+        <a:tint val="40000"/>
+        <a:alpha val="90000"/>
+      </a:schemeClr>
+    </dgm:fillClrLst>
+    <dgm:linClrLst>
+      <a:schemeClr val="accent2">
+        <a:tint val="40000"/>
+        <a:alpha val="90000"/>
+      </a:schemeClr>
+      <a:schemeClr val="accent3">
+        <a:tint val="40000"/>
+        <a:alpha val="90000"/>
+      </a:schemeClr>
+    </dgm:linClrLst>
+    <dgm:effectClrLst/>
+    <dgm:txLinClrLst/>
+    <dgm:txFillClrLst meth="repeat">
+      <a:schemeClr val="dk1"/>
+    </dgm:txFillClrLst>
+    <dgm:txEffectClrLst/>
+  </dgm:styleLbl>
+  <dgm:styleLbl name="alignAccFollowNode1">
+    <dgm:fillClrLst>
+      <a:schemeClr val="accent2">
+        <a:tint val="40000"/>
+        <a:alpha val="90000"/>
+      </a:schemeClr>
+      <a:schemeClr val="accent3">
+        <a:tint val="40000"/>
+        <a:alpha val="90000"/>
+      </a:schemeClr>
+    </dgm:fillClrLst>
+    <dgm:linClrLst>
+      <a:schemeClr val="accent2">
+        <a:tint val="40000"/>
+        <a:alpha val="90000"/>
+      </a:schemeClr>
+      <a:schemeClr val="accent3">
+        <a:tint val="40000"/>
+        <a:alpha val="90000"/>
+      </a:schemeClr>
+    </dgm:linClrLst>
+    <dgm:effectClrLst/>
+    <dgm:txLinClrLst/>
+    <dgm:txFillClrLst meth="repeat">
+      <a:schemeClr val="dk1"/>
+    </dgm:txFillClrLst>
+    <dgm:txEffectClrLst/>
+  </dgm:styleLbl>
+  <dgm:styleLbl name="bgAccFollowNode1">
+    <dgm:fillClrLst>
+      <a:schemeClr val="accent2">
+        <a:tint val="40000"/>
+        <a:alpha val="90000"/>
+      </a:schemeClr>
+      <a:schemeClr val="accent3">
+        <a:tint val="40000"/>
+        <a:alpha val="90000"/>
+      </a:schemeClr>
+    </dgm:fillClrLst>
+    <dgm:linClrLst>
+      <a:schemeClr val="accent2">
+        <a:tint val="40000"/>
+        <a:alpha val="90000"/>
+      </a:schemeClr>
+      <a:schemeClr val="accent3">
+        <a:tint val="40000"/>
+        <a:alpha val="90000"/>
+      </a:schemeClr>
+    </dgm:linClrLst>
+    <dgm:effectClrLst/>
+    <dgm:txLinClrLst/>
+    <dgm:txFillClrLst meth="repeat">
+      <a:schemeClr val="dk1"/>
+    </dgm:txFillClrLst>
+    <dgm:txEffectClrLst/>
+  </dgm:styleLbl>
+  <dgm:styleLbl name="fgAcc0">
+    <dgm:fillClrLst meth="repeat">
+      <a:schemeClr val="lt1">
+        <a:alpha val="90000"/>
+      </a:schemeClr>
+    </dgm:fillClrLst>
+    <dgm:linClrLst>
+      <a:schemeClr val="accent1"/>
+    </dgm:linClrLst>
+    <dgm:effectClrLst/>
+    <dgm:txLinClrLst/>
+    <dgm:txFillClrLst meth="repeat">
+      <a:schemeClr val="dk1"/>
+    </dgm:txFillClrLst>
+    <dgm:txEffectClrLst/>
+  </dgm:styleLbl>
+  <dgm:styleLbl name="fgAcc2">
+    <dgm:fillClrLst meth="repeat">
+      <a:schemeClr val="lt1">
+        <a:alpha val="90000"/>
+      </a:schemeClr>
+    </dgm:fillClrLst>
+    <dgm:linClrLst>
+      <a:schemeClr val="accent3"/>
+    </dgm:linClrLst>
+    <dgm:effectClrLst/>
+    <dgm:txLinClrLst/>
+    <dgm:txFillClrLst meth="repeat">
+      <a:schemeClr val="dk1"/>
+    </dgm:txFillClrLst>
+    <dgm:txEffectClrLst/>
+  </dgm:styleLbl>
+  <dgm:styleLbl name="fgAcc3">
+    <dgm:fillClrLst meth="repeat">
+      <a:schemeClr val="lt1">
+        <a:alpha val="90000"/>
+      </a:schemeClr>
+    </dgm:fillClrLst>
+    <dgm:linClrLst>
+      <a:schemeClr val="accent4"/>
+    </dgm:linClrLst>
+    <dgm:effectClrLst/>
+    <dgm:txLinClrLst/>
+    <dgm:txFillClrLst meth="repeat">
+      <a:schemeClr val="dk1"/>
+    </dgm:txFillClrLst>
+    <dgm:txEffectClrLst/>
+  </dgm:styleLbl>
+  <dgm:styleLbl name="fgAcc4">
+    <dgm:fillClrLst meth="repeat">
+      <a:schemeClr val="lt1">
+        <a:alpha val="90000"/>
+      </a:schemeClr>
+    </dgm:fillClrLst>
+    <dgm:linClrLst>
+      <a:schemeClr val="accent5"/>
+    </dgm:linClrLst>
+    <dgm:effectClrLst/>
+    <dgm:txLinClrLst/>
+    <dgm:txFillClrLst meth="repeat">
+      <a:schemeClr val="dk1"/>
+    </dgm:txFillClrLst>
+    <dgm:txEffectClrLst/>
+  </dgm:styleLbl>
+  <dgm:styleLbl name="bgShp">
+    <dgm:fillClrLst meth="repeat">
+      <a:schemeClr val="accent2">
+        <a:tint val="40000"/>
+      </a:schemeClr>
+    </dgm:fillClrLst>
+    <dgm:linClrLst meth="repeat">
+      <a:schemeClr val="dk1"/>
+    </dgm:linClrLst>
+    <dgm:effectClrLst/>
+    <dgm:txLinClrLst/>
+    <dgm:txFillClrLst meth="repeat">
+      <a:schemeClr val="dk1"/>
+    </dgm:txFillClrLst>
+    <dgm:txEffectClrLst/>
+  </dgm:styleLbl>
+  <dgm:styleLbl name="dkBgShp">
+    <dgm:fillClrLst meth="repeat">
+      <a:schemeClr val="accent2">
+        <a:shade val="90000"/>
+      </a:schemeClr>
+    </dgm:fillClrLst>
+    <dgm:linClrLst meth="repeat">
+      <a:schemeClr val="dk1"/>
+    </dgm:linClrLst>
+    <dgm:effectClrLst/>
+    <dgm:txLinClrLst/>
+    <dgm:txFillClrLst meth="repeat">
+      <a:schemeClr val="lt1"/>
+    </dgm:txFillClrLst>
+    <dgm:txEffectClrLst/>
+  </dgm:styleLbl>
+  <dgm:styleLbl name="trBgShp">
+    <dgm:fillClrLst meth="repeat">
+      <a:schemeClr val="accent2">
+        <a:tint val="50000"/>
+        <a:alpha val="40000"/>
+      </a:schemeClr>
+    </dgm:fillClrLst>
+    <dgm:linClrLst meth="repeat">
+      <a:schemeClr val="accent2"/>
+    </dgm:linClrLst>
+    <dgm:effectClrLst/>
+    <dgm:txLinClrLst/>
+    <dgm:txFillClrLst meth="repeat">
+      <a:schemeClr val="lt1"/>
+    </dgm:txFillClrLst>
+    <dgm:txEffectClrLst/>
+  </dgm:styleLbl>
+  <dgm:styleLbl name="fgShp">
+    <dgm:fillClrLst meth="repeat">
+      <a:schemeClr val="accent2">
+        <a:tint val="40000"/>
+      </a:schemeClr>
+    </dgm:fillClrLst>
+    <dgm:linClrLst meth="repeat">
+      <a:schemeClr val="lt1"/>
+    </dgm:linClrLst>
+    <dgm:effectClrLst/>
+    <dgm:txLinClrLst/>
+    <dgm:txFillClrLst meth="repeat">
+      <a:schemeClr val="dk1"/>
+    </dgm:txFillClrLst>
+    <dgm:txEffectClrLst/>
+  </dgm:styleLbl>
+  <dgm:styleLbl name="revTx">
+    <dgm:fillClrLst meth="repeat">
+      <a:schemeClr val="lt1">
+        <a:alpha val="0"/>
+      </a:schemeClr>
+    </dgm:fillClrLst>
+    <dgm:linClrLst meth="repeat">
+      <a:schemeClr val="dk1">
+        <a:alpha val="0"/>
+      </a:schemeClr>
+    </dgm:linClrLst>
+    <dgm:effectClrLst/>
+    <dgm:txLinClrLst/>
+    <dgm:txFillClrLst meth="repeat">
+      <a:schemeClr val="tx1"/>
+    </dgm:txFillClrLst>
+    <dgm:txEffectClrLst/>
+  </dgm:styleLbl>
+</dgm:colorsDef>
+</file>
+
+<file path=ppt/diagrams/data1.xml><?xml version="1.0" encoding="utf-8"?>
+<dgm:dataModel xmlns:dgm="http://schemas.openxmlformats.org/drawingml/2006/diagram" xmlns:a="http://schemas.openxmlformats.org/drawingml/2006/main">
+  <dgm:ptLst>
+    <dgm:pt modelId="{594B6B4C-EEEE-4647-95F0-D59F01B0AF59}" type="doc">
+      <dgm:prSet loTypeId="urn:microsoft.com/office/officeart/2005/8/layout/list1" loCatId="list" qsTypeId="urn:microsoft.com/office/officeart/2005/8/quickstyle/simple4" qsCatId="simple" csTypeId="urn:microsoft.com/office/officeart/2005/8/colors/colorful2" csCatId="colorful"/>
+      <dgm:spPr/>
+      <dgm:t>
+        <a:bodyPr/>
+        <a:lstStyle/>
+        <a:p>
+          <a:endParaRPr lang="en-US"/>
+        </a:p>
+      </dgm:t>
+    </dgm:pt>
+    <dgm:pt modelId="{983E5B11-F39B-4FF2-90E8-6D99F8B7194C}">
+      <dgm:prSet/>
+      <dgm:spPr/>
+      <dgm:t>
+        <a:bodyPr/>
+        <a:lstStyle/>
+        <a:p>
+          <a:r>
+            <a:rPr lang="en-US"/>
+            <a:t>Data structure two types:</a:t>
+          </a:r>
+        </a:p>
+      </dgm:t>
+    </dgm:pt>
+    <dgm:pt modelId="{0F5F29D9-1BCD-422A-880F-4880497D69D8}" type="parTrans" cxnId="{DE369531-603A-4136-920A-FBCD8C19B0CC}">
+      <dgm:prSet/>
+      <dgm:spPr/>
+      <dgm:t>
+        <a:bodyPr/>
+        <a:lstStyle/>
+        <a:p>
+          <a:endParaRPr lang="en-US"/>
+        </a:p>
+      </dgm:t>
+    </dgm:pt>
+    <dgm:pt modelId="{6443719A-AE94-4EE0-8A8D-A987EA36D3D7}" type="sibTrans" cxnId="{DE369531-603A-4136-920A-FBCD8C19B0CC}">
+      <dgm:prSet/>
+      <dgm:spPr/>
+      <dgm:t>
+        <a:bodyPr/>
+        <a:lstStyle/>
+        <a:p>
+          <a:endParaRPr lang="en-US"/>
+        </a:p>
+      </dgm:t>
+    </dgm:pt>
+    <dgm:pt modelId="{ABD6E1D1-DCB5-4418-A3E2-1EB8D256DB68}">
+      <dgm:prSet/>
+      <dgm:spPr/>
+      <dgm:t>
+        <a:bodyPr/>
+        <a:lstStyle/>
+        <a:p>
+          <a:r>
+            <a:rPr lang="en-US"/>
+            <a:t>Linear Data Structure</a:t>
+          </a:r>
+        </a:p>
+      </dgm:t>
+    </dgm:pt>
+    <dgm:pt modelId="{D582F350-92C2-4029-8B18-F51D7883864F}" type="parTrans" cxnId="{1965E4E1-553F-4C45-8841-C970F479C241}">
+      <dgm:prSet/>
+      <dgm:spPr/>
+      <dgm:t>
+        <a:bodyPr/>
+        <a:lstStyle/>
+        <a:p>
+          <a:endParaRPr lang="en-US"/>
+        </a:p>
+      </dgm:t>
+    </dgm:pt>
+    <dgm:pt modelId="{0801D4DA-A9B8-4B37-8413-45C4253BE8C9}" type="sibTrans" cxnId="{1965E4E1-553F-4C45-8841-C970F479C241}">
+      <dgm:prSet/>
+      <dgm:spPr/>
+      <dgm:t>
+        <a:bodyPr/>
+        <a:lstStyle/>
+        <a:p>
+          <a:endParaRPr lang="en-US"/>
+        </a:p>
+      </dgm:t>
+    </dgm:pt>
+    <dgm:pt modelId="{CF0F1309-E9D4-4017-978A-26BE9497FB0B}">
+      <dgm:prSet/>
+      <dgm:spPr/>
+      <dgm:t>
+        <a:bodyPr/>
+        <a:lstStyle/>
+        <a:p>
+          <a:r>
+            <a:rPr lang="en-US"/>
+            <a:t>Static data structure</a:t>
+          </a:r>
+        </a:p>
+      </dgm:t>
+    </dgm:pt>
+    <dgm:pt modelId="{59829E74-1DA1-4A49-86C6-FDCE7A37294F}" type="parTrans" cxnId="{7A1D744E-24A0-464C-8C27-6C0C2AF7FAA5}">
+      <dgm:prSet/>
+      <dgm:spPr/>
+      <dgm:t>
+        <a:bodyPr/>
+        <a:lstStyle/>
+        <a:p>
+          <a:endParaRPr lang="en-US"/>
+        </a:p>
+      </dgm:t>
+    </dgm:pt>
+    <dgm:pt modelId="{B7C95F0C-2322-440C-85B6-9539CFA3437C}" type="sibTrans" cxnId="{7A1D744E-24A0-464C-8C27-6C0C2AF7FAA5}">
+      <dgm:prSet/>
+      <dgm:spPr/>
+      <dgm:t>
+        <a:bodyPr/>
+        <a:lstStyle/>
+        <a:p>
+          <a:endParaRPr lang="en-US"/>
+        </a:p>
+      </dgm:t>
+    </dgm:pt>
+    <dgm:pt modelId="{D0F81ACC-ED2B-4EF5-B043-E1A5896F6E1E}">
+      <dgm:prSet/>
+      <dgm:spPr/>
+      <dgm:t>
+        <a:bodyPr/>
+        <a:lstStyle/>
+        <a:p>
+          <a:r>
+            <a:rPr lang="en-US"/>
+            <a:t>Array</a:t>
+          </a:r>
+        </a:p>
+      </dgm:t>
+    </dgm:pt>
+    <dgm:pt modelId="{129EF907-4AA7-4F92-99E7-5964D818BDCA}" type="parTrans" cxnId="{82EB9943-393C-459F-9BD7-62EBDF5730A2}">
+      <dgm:prSet/>
+      <dgm:spPr/>
+      <dgm:t>
+        <a:bodyPr/>
+        <a:lstStyle/>
+        <a:p>
+          <a:endParaRPr lang="en-US"/>
+        </a:p>
+      </dgm:t>
+    </dgm:pt>
+    <dgm:pt modelId="{00FCC9E3-3ADC-4F90-882F-6362EA980A79}" type="sibTrans" cxnId="{82EB9943-393C-459F-9BD7-62EBDF5730A2}">
+      <dgm:prSet/>
+      <dgm:spPr/>
+      <dgm:t>
+        <a:bodyPr/>
+        <a:lstStyle/>
+        <a:p>
+          <a:endParaRPr lang="en-US"/>
+        </a:p>
+      </dgm:t>
+    </dgm:pt>
+    <dgm:pt modelId="{9761BBB9-4B3E-4F2E-98AC-2763565FFCAD}">
+      <dgm:prSet/>
+      <dgm:spPr/>
+      <dgm:t>
+        <a:bodyPr/>
+        <a:lstStyle/>
+        <a:p>
+          <a:r>
+            <a:rPr lang="en-US"/>
+            <a:t>Dynamic data structure</a:t>
+          </a:r>
+        </a:p>
+      </dgm:t>
+    </dgm:pt>
+    <dgm:pt modelId="{EB5BFC85-7B25-448F-B4CC-A456BC98E42F}" type="parTrans" cxnId="{FB88015C-4654-47BA-A911-2D518209D221}">
+      <dgm:prSet/>
+      <dgm:spPr/>
+      <dgm:t>
+        <a:bodyPr/>
+        <a:lstStyle/>
+        <a:p>
+          <a:endParaRPr lang="en-US"/>
+        </a:p>
+      </dgm:t>
+    </dgm:pt>
+    <dgm:pt modelId="{311E3113-242D-4D0A-85FB-AE52587C7A94}" type="sibTrans" cxnId="{FB88015C-4654-47BA-A911-2D518209D221}">
+      <dgm:prSet/>
+      <dgm:spPr/>
+      <dgm:t>
+        <a:bodyPr/>
+        <a:lstStyle/>
+        <a:p>
+          <a:endParaRPr lang="en-US"/>
+        </a:p>
+      </dgm:t>
+    </dgm:pt>
+    <dgm:pt modelId="{B03514C7-A6E3-4871-86EF-ABA11074E690}">
+      <dgm:prSet/>
+      <dgm:spPr/>
+      <dgm:t>
+        <a:bodyPr/>
+        <a:lstStyle/>
+        <a:p>
+          <a:r>
+            <a:rPr lang="en-US"/>
+            <a:t>Queue</a:t>
+          </a:r>
+        </a:p>
+      </dgm:t>
+    </dgm:pt>
+    <dgm:pt modelId="{A443417D-5D70-4E64-A72C-3BD136EFE845}" type="parTrans" cxnId="{66355B94-0837-4F0B-BB4B-B1DEB300A9F5}">
+      <dgm:prSet/>
+      <dgm:spPr/>
+      <dgm:t>
+        <a:bodyPr/>
+        <a:lstStyle/>
+        <a:p>
+          <a:endParaRPr lang="en-US"/>
+        </a:p>
+      </dgm:t>
+    </dgm:pt>
+    <dgm:pt modelId="{28FCF245-3A09-4C29-A38E-43B9DB5239AF}" type="sibTrans" cxnId="{66355B94-0837-4F0B-BB4B-B1DEB300A9F5}">
+      <dgm:prSet/>
+      <dgm:spPr/>
+      <dgm:t>
+        <a:bodyPr/>
+        <a:lstStyle/>
+        <a:p>
+          <a:endParaRPr lang="en-US"/>
+        </a:p>
+      </dgm:t>
+    </dgm:pt>
+    <dgm:pt modelId="{FE329703-0FE4-4FAA-94C3-4BCF1868C848}">
+      <dgm:prSet/>
+      <dgm:spPr/>
+      <dgm:t>
+        <a:bodyPr/>
+        <a:lstStyle/>
+        <a:p>
+          <a:r>
+            <a:rPr lang="en-US"/>
+            <a:t>Stack</a:t>
+          </a:r>
+        </a:p>
+      </dgm:t>
+    </dgm:pt>
+    <dgm:pt modelId="{96D8EB7F-240D-4A0A-B406-BC6FC405FBB4}" type="parTrans" cxnId="{5B34C7B4-BABB-4F41-BC7F-5A4BE8E396A4}">
+      <dgm:prSet/>
+      <dgm:spPr/>
+      <dgm:t>
+        <a:bodyPr/>
+        <a:lstStyle/>
+        <a:p>
+          <a:endParaRPr lang="en-US"/>
+        </a:p>
+      </dgm:t>
+    </dgm:pt>
+    <dgm:pt modelId="{47E59D5F-FE10-4944-A25E-C518886B764D}" type="sibTrans" cxnId="{5B34C7B4-BABB-4F41-BC7F-5A4BE8E396A4}">
+      <dgm:prSet/>
+      <dgm:spPr/>
+      <dgm:t>
+        <a:bodyPr/>
+        <a:lstStyle/>
+        <a:p>
+          <a:endParaRPr lang="en-US"/>
+        </a:p>
+      </dgm:t>
+    </dgm:pt>
+    <dgm:pt modelId="{A4445E3F-EE7A-42CD-A09E-6E8CE167FEBE}">
+      <dgm:prSet/>
+      <dgm:spPr/>
+      <dgm:t>
+        <a:bodyPr/>
+        <a:lstStyle/>
+        <a:p>
+          <a:r>
+            <a:rPr lang="en-US"/>
+            <a:t>Linked list</a:t>
+          </a:r>
+        </a:p>
+      </dgm:t>
+    </dgm:pt>
+    <dgm:pt modelId="{1FCCFFBF-6D36-4CA1-B90A-F4463B68DDD8}" type="parTrans" cxnId="{9EA6F9BC-42D4-43C4-8664-75FC1AE1A477}">
+      <dgm:prSet/>
+      <dgm:spPr/>
+      <dgm:t>
+        <a:bodyPr/>
+        <a:lstStyle/>
+        <a:p>
+          <a:endParaRPr lang="en-US"/>
+        </a:p>
+      </dgm:t>
+    </dgm:pt>
+    <dgm:pt modelId="{AB3049D5-DA76-48B0-B800-646E151B6631}" type="sibTrans" cxnId="{9EA6F9BC-42D4-43C4-8664-75FC1AE1A477}">
+      <dgm:prSet/>
+      <dgm:spPr/>
+      <dgm:t>
+        <a:bodyPr/>
+        <a:lstStyle/>
+        <a:p>
+          <a:endParaRPr lang="en-US"/>
+        </a:p>
+      </dgm:t>
+    </dgm:pt>
+    <dgm:pt modelId="{9842E2DD-6022-4DD7-BEA5-757867150D70}">
+      <dgm:prSet/>
+      <dgm:spPr/>
+      <dgm:t>
+        <a:bodyPr/>
+        <a:lstStyle/>
+        <a:p>
+          <a:r>
+            <a:rPr lang="en-US"/>
+            <a:t>Non-linear Data Structure</a:t>
+          </a:r>
+        </a:p>
+      </dgm:t>
+    </dgm:pt>
+    <dgm:pt modelId="{17236140-4DC4-4B51-9FBB-B0AC9633A0F1}" type="parTrans" cxnId="{79D29997-AAC8-45DB-8966-0FF778227CC4}">
+      <dgm:prSet/>
+      <dgm:spPr/>
+      <dgm:t>
+        <a:bodyPr/>
+        <a:lstStyle/>
+        <a:p>
+          <a:endParaRPr lang="en-US"/>
+        </a:p>
+      </dgm:t>
+    </dgm:pt>
+    <dgm:pt modelId="{C6616F6B-4F42-472B-BBC9-EE301E55F913}" type="sibTrans" cxnId="{79D29997-AAC8-45DB-8966-0FF778227CC4}">
+      <dgm:prSet/>
+      <dgm:spPr/>
+      <dgm:t>
+        <a:bodyPr/>
+        <a:lstStyle/>
+        <a:p>
+          <a:endParaRPr lang="en-US"/>
+        </a:p>
+      </dgm:t>
+    </dgm:pt>
+    <dgm:pt modelId="{B59581C6-9CA7-4E63-ABA0-77C263AF9C6E}">
+      <dgm:prSet/>
+      <dgm:spPr/>
+      <dgm:t>
+        <a:bodyPr/>
+        <a:lstStyle/>
+        <a:p>
+          <a:r>
+            <a:rPr lang="en-US"/>
+            <a:t>Tree data structure</a:t>
+          </a:r>
+        </a:p>
+      </dgm:t>
+    </dgm:pt>
+    <dgm:pt modelId="{DDF459B0-DA86-4D30-99D7-69E328CC490B}" type="parTrans" cxnId="{F65F6C0D-E4C6-474D-B89F-43F7FF4E81F9}">
+      <dgm:prSet/>
+      <dgm:spPr/>
+      <dgm:t>
+        <a:bodyPr/>
+        <a:lstStyle/>
+        <a:p>
+          <a:endParaRPr lang="en-US"/>
+        </a:p>
+      </dgm:t>
+    </dgm:pt>
+    <dgm:pt modelId="{FF9B7BB9-2F44-4D6B-A4E2-F9505C7858FE}" type="sibTrans" cxnId="{F65F6C0D-E4C6-474D-B89F-43F7FF4E81F9}">
+      <dgm:prSet/>
+      <dgm:spPr/>
+      <dgm:t>
+        <a:bodyPr/>
+        <a:lstStyle/>
+        <a:p>
+          <a:endParaRPr lang="en-US"/>
+        </a:p>
+      </dgm:t>
+    </dgm:pt>
+    <dgm:pt modelId="{F54C5E3A-7ABC-4095-A81B-B71BF8333050}">
+      <dgm:prSet/>
+      <dgm:spPr/>
+      <dgm:t>
+        <a:bodyPr/>
+        <a:lstStyle/>
+        <a:p>
+          <a:r>
+            <a:rPr lang="en-US"/>
+            <a:t>Graph data structure</a:t>
+          </a:r>
+        </a:p>
+      </dgm:t>
+    </dgm:pt>
+    <dgm:pt modelId="{A29D5137-E9A1-4F62-AD4A-CAD3BCDBCEB4}" type="parTrans" cxnId="{CCDE5451-D546-4F3B-BB42-657292AA492D}">
+      <dgm:prSet/>
+      <dgm:spPr/>
+      <dgm:t>
+        <a:bodyPr/>
+        <a:lstStyle/>
+        <a:p>
+          <a:endParaRPr lang="en-US"/>
+        </a:p>
+      </dgm:t>
+    </dgm:pt>
+    <dgm:pt modelId="{9787068D-B254-41C5-9F2F-26513A097FA0}" type="sibTrans" cxnId="{CCDE5451-D546-4F3B-BB42-657292AA492D}">
+      <dgm:prSet/>
+      <dgm:spPr/>
+      <dgm:t>
+        <a:bodyPr/>
+        <a:lstStyle/>
+        <a:p>
+          <a:endParaRPr lang="en-US"/>
+        </a:p>
+      </dgm:t>
+    </dgm:pt>
+    <dgm:pt modelId="{343328DB-9EA6-4F25-AA5E-C176AAD92E7D}" type="pres">
+      <dgm:prSet presAssocID="{594B6B4C-EEEE-4647-95F0-D59F01B0AF59}" presName="linear" presStyleCnt="0">
+        <dgm:presLayoutVars>
+          <dgm:dir/>
+          <dgm:animLvl val="lvl"/>
+          <dgm:resizeHandles val="exact"/>
+        </dgm:presLayoutVars>
+      </dgm:prSet>
+      <dgm:spPr/>
+    </dgm:pt>
+    <dgm:pt modelId="{1254A2EF-0C07-4712-A1CA-2899E5176BF1}" type="pres">
+      <dgm:prSet presAssocID="{983E5B11-F39B-4FF2-90E8-6D99F8B7194C}" presName="parentLin" presStyleCnt="0"/>
+      <dgm:spPr/>
+    </dgm:pt>
+    <dgm:pt modelId="{6E059D79-61F2-469C-8BE0-724F80ECF7FF}" type="pres">
+      <dgm:prSet presAssocID="{983E5B11-F39B-4FF2-90E8-6D99F8B7194C}" presName="parentLeftMargin" presStyleLbl="node1" presStyleIdx="0" presStyleCnt="1"/>
+      <dgm:spPr/>
+    </dgm:pt>
+    <dgm:pt modelId="{AFC28D6A-2691-4297-9AEF-EC9ECF939E0A}" type="pres">
+      <dgm:prSet presAssocID="{983E5B11-F39B-4FF2-90E8-6D99F8B7194C}" presName="parentText" presStyleLbl="node1" presStyleIdx="0" presStyleCnt="1">
+        <dgm:presLayoutVars>
+          <dgm:chMax val="0"/>
+          <dgm:bulletEnabled val="1"/>
+        </dgm:presLayoutVars>
+      </dgm:prSet>
+      <dgm:spPr/>
+    </dgm:pt>
+    <dgm:pt modelId="{E7E86FFF-E7A3-44D8-A577-EB04C05CF123}" type="pres">
+      <dgm:prSet presAssocID="{983E5B11-F39B-4FF2-90E8-6D99F8B7194C}" presName="negativeSpace" presStyleCnt="0"/>
+      <dgm:spPr/>
+    </dgm:pt>
+    <dgm:pt modelId="{1DA83C85-7091-4A47-890A-2CEF6F5BC856}" type="pres">
+      <dgm:prSet presAssocID="{983E5B11-F39B-4FF2-90E8-6D99F8B7194C}" presName="childText" presStyleLbl="conFgAcc1" presStyleIdx="0" presStyleCnt="1">
+        <dgm:presLayoutVars>
+          <dgm:bulletEnabled val="1"/>
+        </dgm:presLayoutVars>
+      </dgm:prSet>
+      <dgm:spPr/>
+    </dgm:pt>
+  </dgm:ptLst>
+  <dgm:cxnLst>
+    <dgm:cxn modelId="{C8CE4F01-CC09-474E-995F-08057B66B482}" type="presOf" srcId="{ABD6E1D1-DCB5-4418-A3E2-1EB8D256DB68}" destId="{1DA83C85-7091-4A47-890A-2CEF6F5BC856}" srcOrd="0" destOrd="0" presId="urn:microsoft.com/office/officeart/2005/8/layout/list1"/>
+    <dgm:cxn modelId="{81C06407-2708-4590-BAF0-FE1FBEDE626E}" type="presOf" srcId="{D0F81ACC-ED2B-4EF5-B043-E1A5896F6E1E}" destId="{1DA83C85-7091-4A47-890A-2CEF6F5BC856}" srcOrd="0" destOrd="2" presId="urn:microsoft.com/office/officeart/2005/8/layout/list1"/>
+    <dgm:cxn modelId="{F823AD09-555D-447C-9EA8-93CBD16D069E}" type="presOf" srcId="{9761BBB9-4B3E-4F2E-98AC-2763565FFCAD}" destId="{1DA83C85-7091-4A47-890A-2CEF6F5BC856}" srcOrd="0" destOrd="3" presId="urn:microsoft.com/office/officeart/2005/8/layout/list1"/>
+    <dgm:cxn modelId="{F65F6C0D-E4C6-474D-B89F-43F7FF4E81F9}" srcId="{9842E2DD-6022-4DD7-BEA5-757867150D70}" destId="{B59581C6-9CA7-4E63-ABA0-77C263AF9C6E}" srcOrd="0" destOrd="0" parTransId="{DDF459B0-DA86-4D30-99D7-69E328CC490B}" sibTransId="{FF9B7BB9-2F44-4D6B-A4E2-F9505C7858FE}"/>
+    <dgm:cxn modelId="{E7817E23-B27F-4803-93B3-AC2A23F470A1}" type="presOf" srcId="{B03514C7-A6E3-4871-86EF-ABA11074E690}" destId="{1DA83C85-7091-4A47-890A-2CEF6F5BC856}" srcOrd="0" destOrd="4" presId="urn:microsoft.com/office/officeart/2005/8/layout/list1"/>
+    <dgm:cxn modelId="{DE369531-603A-4136-920A-FBCD8C19B0CC}" srcId="{594B6B4C-EEEE-4647-95F0-D59F01B0AF59}" destId="{983E5B11-F39B-4FF2-90E8-6D99F8B7194C}" srcOrd="0" destOrd="0" parTransId="{0F5F29D9-1BCD-422A-880F-4880497D69D8}" sibTransId="{6443719A-AE94-4EE0-8A8D-A987EA36D3D7}"/>
+    <dgm:cxn modelId="{7740A637-AB4F-41DA-B15B-ED8AE02AA43A}" type="presOf" srcId="{983E5B11-F39B-4FF2-90E8-6D99F8B7194C}" destId="{AFC28D6A-2691-4297-9AEF-EC9ECF939E0A}" srcOrd="1" destOrd="0" presId="urn:microsoft.com/office/officeart/2005/8/layout/list1"/>
+    <dgm:cxn modelId="{B5CA7D3E-DB74-40B6-A6A9-2BBCAA6E7A3C}" type="presOf" srcId="{983E5B11-F39B-4FF2-90E8-6D99F8B7194C}" destId="{6E059D79-61F2-469C-8BE0-724F80ECF7FF}" srcOrd="0" destOrd="0" presId="urn:microsoft.com/office/officeart/2005/8/layout/list1"/>
+    <dgm:cxn modelId="{FB88015C-4654-47BA-A911-2D518209D221}" srcId="{ABD6E1D1-DCB5-4418-A3E2-1EB8D256DB68}" destId="{9761BBB9-4B3E-4F2E-98AC-2763565FFCAD}" srcOrd="1" destOrd="0" parTransId="{EB5BFC85-7B25-448F-B4CC-A456BC98E42F}" sibTransId="{311E3113-242D-4D0A-85FB-AE52587C7A94}"/>
+    <dgm:cxn modelId="{82EB9943-393C-459F-9BD7-62EBDF5730A2}" srcId="{CF0F1309-E9D4-4017-978A-26BE9497FB0B}" destId="{D0F81ACC-ED2B-4EF5-B043-E1A5896F6E1E}" srcOrd="0" destOrd="0" parTransId="{129EF907-4AA7-4F92-99E7-5964D818BDCA}" sibTransId="{00FCC9E3-3ADC-4F90-882F-6362EA980A79}"/>
+    <dgm:cxn modelId="{C6000A4C-8E08-4DDD-99CC-6CDAA664F0B2}" type="presOf" srcId="{9842E2DD-6022-4DD7-BEA5-757867150D70}" destId="{1DA83C85-7091-4A47-890A-2CEF6F5BC856}" srcOrd="0" destOrd="7" presId="urn:microsoft.com/office/officeart/2005/8/layout/list1"/>
+    <dgm:cxn modelId="{7A1D744E-24A0-464C-8C27-6C0C2AF7FAA5}" srcId="{ABD6E1D1-DCB5-4418-A3E2-1EB8D256DB68}" destId="{CF0F1309-E9D4-4017-978A-26BE9497FB0B}" srcOrd="0" destOrd="0" parTransId="{59829E74-1DA1-4A49-86C6-FDCE7A37294F}" sibTransId="{B7C95F0C-2322-440C-85B6-9539CFA3437C}"/>
+    <dgm:cxn modelId="{CCDE5451-D546-4F3B-BB42-657292AA492D}" srcId="{9842E2DD-6022-4DD7-BEA5-757867150D70}" destId="{F54C5E3A-7ABC-4095-A81B-B71BF8333050}" srcOrd="1" destOrd="0" parTransId="{A29D5137-E9A1-4F62-AD4A-CAD3BCDBCEB4}" sibTransId="{9787068D-B254-41C5-9F2F-26513A097FA0}"/>
+    <dgm:cxn modelId="{CCB8C77D-18A0-4264-99DE-A41378DF2FB6}" type="presOf" srcId="{F54C5E3A-7ABC-4095-A81B-B71BF8333050}" destId="{1DA83C85-7091-4A47-890A-2CEF6F5BC856}" srcOrd="0" destOrd="9" presId="urn:microsoft.com/office/officeart/2005/8/layout/list1"/>
+    <dgm:cxn modelId="{37BAB582-2CE2-4FE9-80F1-EE9792F90731}" type="presOf" srcId="{B59581C6-9CA7-4E63-ABA0-77C263AF9C6E}" destId="{1DA83C85-7091-4A47-890A-2CEF6F5BC856}" srcOrd="0" destOrd="8" presId="urn:microsoft.com/office/officeart/2005/8/layout/list1"/>
+    <dgm:cxn modelId="{66355B94-0837-4F0B-BB4B-B1DEB300A9F5}" srcId="{9761BBB9-4B3E-4F2E-98AC-2763565FFCAD}" destId="{B03514C7-A6E3-4871-86EF-ABA11074E690}" srcOrd="0" destOrd="0" parTransId="{A443417D-5D70-4E64-A72C-3BD136EFE845}" sibTransId="{28FCF245-3A09-4C29-A38E-43B9DB5239AF}"/>
+    <dgm:cxn modelId="{79D29997-AAC8-45DB-8966-0FF778227CC4}" srcId="{983E5B11-F39B-4FF2-90E8-6D99F8B7194C}" destId="{9842E2DD-6022-4DD7-BEA5-757867150D70}" srcOrd="1" destOrd="0" parTransId="{17236140-4DC4-4B51-9FBB-B0AC9633A0F1}" sibTransId="{C6616F6B-4F42-472B-BBC9-EE301E55F913}"/>
+    <dgm:cxn modelId="{5B34C7B4-BABB-4F41-BC7F-5A4BE8E396A4}" srcId="{9761BBB9-4B3E-4F2E-98AC-2763565FFCAD}" destId="{FE329703-0FE4-4FAA-94C3-4BCF1868C848}" srcOrd="1" destOrd="0" parTransId="{96D8EB7F-240D-4A0A-B406-BC6FC405FBB4}" sibTransId="{47E59D5F-FE10-4944-A25E-C518886B764D}"/>
+    <dgm:cxn modelId="{9EA6F9BC-42D4-43C4-8664-75FC1AE1A477}" srcId="{9761BBB9-4B3E-4F2E-98AC-2763565FFCAD}" destId="{A4445E3F-EE7A-42CD-A09E-6E8CE167FEBE}" srcOrd="2" destOrd="0" parTransId="{1FCCFFBF-6D36-4CA1-B90A-F4463B68DDD8}" sibTransId="{AB3049D5-DA76-48B0-B800-646E151B6631}"/>
+    <dgm:cxn modelId="{4ADCD4BF-13EE-4865-8D37-45F0A67CA766}" type="presOf" srcId="{CF0F1309-E9D4-4017-978A-26BE9497FB0B}" destId="{1DA83C85-7091-4A47-890A-2CEF6F5BC856}" srcOrd="0" destOrd="1" presId="urn:microsoft.com/office/officeart/2005/8/layout/list1"/>
+    <dgm:cxn modelId="{65CDD3D9-47D0-43DA-AF2A-8130686E6531}" type="presOf" srcId="{A4445E3F-EE7A-42CD-A09E-6E8CE167FEBE}" destId="{1DA83C85-7091-4A47-890A-2CEF6F5BC856}" srcOrd="0" destOrd="6" presId="urn:microsoft.com/office/officeart/2005/8/layout/list1"/>
+    <dgm:cxn modelId="{1965E4E1-553F-4C45-8841-C970F479C241}" srcId="{983E5B11-F39B-4FF2-90E8-6D99F8B7194C}" destId="{ABD6E1D1-DCB5-4418-A3E2-1EB8D256DB68}" srcOrd="0" destOrd="0" parTransId="{D582F350-92C2-4029-8B18-F51D7883864F}" sibTransId="{0801D4DA-A9B8-4B37-8413-45C4253BE8C9}"/>
+    <dgm:cxn modelId="{6C2B3FF1-5B82-4426-A739-2F0995BD5ED2}" type="presOf" srcId="{594B6B4C-EEEE-4647-95F0-D59F01B0AF59}" destId="{343328DB-9EA6-4F25-AA5E-C176AAD92E7D}" srcOrd="0" destOrd="0" presId="urn:microsoft.com/office/officeart/2005/8/layout/list1"/>
+    <dgm:cxn modelId="{0AB02FF2-EB15-4B46-A3A1-B0D62C62F1AB}" type="presOf" srcId="{FE329703-0FE4-4FAA-94C3-4BCF1868C848}" destId="{1DA83C85-7091-4A47-890A-2CEF6F5BC856}" srcOrd="0" destOrd="5" presId="urn:microsoft.com/office/officeart/2005/8/layout/list1"/>
+    <dgm:cxn modelId="{271F1C67-2137-4A77-B6A1-A7E56276FFC9}" type="presParOf" srcId="{343328DB-9EA6-4F25-AA5E-C176AAD92E7D}" destId="{1254A2EF-0C07-4712-A1CA-2899E5176BF1}" srcOrd="0" destOrd="0" presId="urn:microsoft.com/office/officeart/2005/8/layout/list1"/>
+    <dgm:cxn modelId="{E7884AE7-7736-4689-8DC7-7A38ABF36572}" type="presParOf" srcId="{1254A2EF-0C07-4712-A1CA-2899E5176BF1}" destId="{6E059D79-61F2-469C-8BE0-724F80ECF7FF}" srcOrd="0" destOrd="0" presId="urn:microsoft.com/office/officeart/2005/8/layout/list1"/>
+    <dgm:cxn modelId="{779CC129-D047-49B0-AF0E-4A0A2C7834FE}" type="presParOf" srcId="{1254A2EF-0C07-4712-A1CA-2899E5176BF1}" destId="{AFC28D6A-2691-4297-9AEF-EC9ECF939E0A}" srcOrd="1" destOrd="0" presId="urn:microsoft.com/office/officeart/2005/8/layout/list1"/>
+    <dgm:cxn modelId="{E714DE92-883C-46FA-9349-9CC7463C62D0}" type="presParOf" srcId="{343328DB-9EA6-4F25-AA5E-C176AAD92E7D}" destId="{E7E86FFF-E7A3-44D8-A577-EB04C05CF123}" srcOrd="1" destOrd="0" presId="urn:microsoft.com/office/officeart/2005/8/layout/list1"/>
+    <dgm:cxn modelId="{038836F9-5A03-45CF-82A8-D928B8EE04D4}" type="presParOf" srcId="{343328DB-9EA6-4F25-AA5E-C176AAD92E7D}" destId="{1DA83C85-7091-4A47-890A-2CEF6F5BC856}" srcOrd="2" destOrd="0" presId="urn:microsoft.com/office/officeart/2005/8/layout/list1"/>
+  </dgm:cxnLst>
+  <dgm:bg/>
+  <dgm:whole/>
+  <dgm:extLst>
+    <a:ext uri="http://schemas.microsoft.com/office/drawing/2008/diagram">
+      <dsp:dataModelExt xmlns:dsp="http://schemas.microsoft.com/office/drawing/2008/diagram" relId="rId6" minVer="http://schemas.openxmlformats.org/drawingml/2006/diagram"/>
+    </a:ext>
+  </dgm:extLst>
+</dgm:dataModel>
+</file>
+
+<file path=ppt/diagrams/drawing1.xml><?xml version="1.0" encoding="utf-8"?>
+<dsp:drawing xmlns:dgm="http://schemas.openxmlformats.org/drawingml/2006/diagram" xmlns:dsp="http://schemas.microsoft.com/office/drawing/2008/diagram" xmlns:a="http://schemas.openxmlformats.org/drawingml/2006/main">
+  <dsp:spTree>
+    <dsp:nvGrpSpPr>
+      <dsp:cNvPr id="0" name=""/>
+      <dsp:cNvGrpSpPr/>
+    </dsp:nvGrpSpPr>
+    <dsp:grpSpPr/>
+    <dsp:sp modelId="{1DA83C85-7091-4A47-890A-2CEF6F5BC856}">
+      <dsp:nvSpPr>
+        <dsp:cNvPr id="0" name=""/>
+        <dsp:cNvSpPr/>
+      </dsp:nvSpPr>
+      <dsp:spPr>
+        <a:xfrm>
+          <a:off x="0" y="461839"/>
+          <a:ext cx="6666833" cy="4914000"/>
+        </a:xfrm>
+        <a:prstGeom prst="rect">
+          <a:avLst/>
+        </a:prstGeom>
+        <a:solidFill>
+          <a:schemeClr val="lt1">
+            <a:alpha val="90000"/>
+            <a:hueOff val="0"/>
+            <a:satOff val="0"/>
+            <a:lumOff val="0"/>
+            <a:alphaOff val="0"/>
+          </a:schemeClr>
+        </a:solidFill>
+        <a:ln w="6350" cap="flat" cmpd="sng" algn="ctr">
+          <a:solidFill>
+            <a:schemeClr val="accent2">
+              <a:hueOff val="0"/>
+              <a:satOff val="0"/>
+              <a:lumOff val="0"/>
+              <a:alphaOff val="0"/>
+            </a:schemeClr>
+          </a:solidFill>
+          <a:prstDash val="solid"/>
+          <a:miter lim="800000"/>
+        </a:ln>
+        <a:effectLst/>
+      </dsp:spPr>
+      <dsp:style>
+        <a:lnRef idx="1">
+          <a:scrgbClr r="0" g="0" b="0"/>
+        </a:lnRef>
+        <a:fillRef idx="1">
+          <a:scrgbClr r="0" g="0" b="0"/>
+        </a:fillRef>
+        <a:effectRef idx="0">
+          <a:scrgbClr r="0" g="0" b="0"/>
+        </a:effectRef>
+        <a:fontRef idx="minor"/>
+      </dsp:style>
+      <dsp:txBody>
+        <a:bodyPr spcFirstLastPara="0" vert="horz" wrap="square" lIns="517420" tIns="541528" rIns="517420" bIns="184912" numCol="1" spcCol="1270" anchor="t" anchorCtr="0">
+          <a:noAutofit/>
+        </a:bodyPr>
+        <a:lstStyle/>
+        <a:p>
+          <a:pPr marL="228600" lvl="1" indent="-228600" algn="l" defTabSz="1155700">
+            <a:lnSpc>
+              <a:spcPct val="90000"/>
+            </a:lnSpc>
+            <a:spcBef>
+              <a:spcPct val="0"/>
+            </a:spcBef>
+            <a:spcAft>
+              <a:spcPct val="15000"/>
+            </a:spcAft>
+            <a:buChar char="•"/>
+          </a:pPr>
+          <a:r>
+            <a:rPr lang="en-US" sz="2600" kern="1200"/>
+            <a:t>Linear Data Structure</a:t>
+          </a:r>
+        </a:p>
+        <a:p>
+          <a:pPr marL="457200" lvl="2" indent="-228600" algn="l" defTabSz="1155700">
+            <a:lnSpc>
+              <a:spcPct val="90000"/>
+            </a:lnSpc>
+            <a:spcBef>
+              <a:spcPct val="0"/>
+            </a:spcBef>
+            <a:spcAft>
+              <a:spcPct val="15000"/>
+            </a:spcAft>
+            <a:buChar char="•"/>
+          </a:pPr>
+          <a:r>
+            <a:rPr lang="en-US" sz="2600" kern="1200"/>
+            <a:t>Static data structure</a:t>
+          </a:r>
+        </a:p>
+        <a:p>
+          <a:pPr marL="685800" lvl="3" indent="-228600" algn="l" defTabSz="1155700">
+            <a:lnSpc>
+              <a:spcPct val="90000"/>
+            </a:lnSpc>
+            <a:spcBef>
+              <a:spcPct val="0"/>
+            </a:spcBef>
+            <a:spcAft>
+              <a:spcPct val="15000"/>
+            </a:spcAft>
+            <a:buChar char="•"/>
+          </a:pPr>
+          <a:r>
+            <a:rPr lang="en-US" sz="2600" kern="1200"/>
+            <a:t>Array</a:t>
+          </a:r>
+        </a:p>
+        <a:p>
+          <a:pPr marL="457200" lvl="2" indent="-228600" algn="l" defTabSz="1155700">
+            <a:lnSpc>
+              <a:spcPct val="90000"/>
+            </a:lnSpc>
+            <a:spcBef>
+              <a:spcPct val="0"/>
+            </a:spcBef>
+            <a:spcAft>
+              <a:spcPct val="15000"/>
+            </a:spcAft>
+            <a:buChar char="•"/>
+          </a:pPr>
+          <a:r>
+            <a:rPr lang="en-US" sz="2600" kern="1200"/>
+            <a:t>Dynamic data structure</a:t>
+          </a:r>
+        </a:p>
+        <a:p>
+          <a:pPr marL="685800" lvl="3" indent="-228600" algn="l" defTabSz="1155700">
+            <a:lnSpc>
+              <a:spcPct val="90000"/>
+            </a:lnSpc>
+            <a:spcBef>
+              <a:spcPct val="0"/>
+            </a:spcBef>
+            <a:spcAft>
+              <a:spcPct val="15000"/>
+            </a:spcAft>
+            <a:buChar char="•"/>
+          </a:pPr>
+          <a:r>
+            <a:rPr lang="en-US" sz="2600" kern="1200"/>
+            <a:t>Queue</a:t>
+          </a:r>
+        </a:p>
+        <a:p>
+          <a:pPr marL="685800" lvl="3" indent="-228600" algn="l" defTabSz="1155700">
+            <a:lnSpc>
+              <a:spcPct val="90000"/>
+            </a:lnSpc>
+            <a:spcBef>
+              <a:spcPct val="0"/>
+            </a:spcBef>
+            <a:spcAft>
+              <a:spcPct val="15000"/>
+            </a:spcAft>
+            <a:buChar char="•"/>
+          </a:pPr>
+          <a:r>
+            <a:rPr lang="en-US" sz="2600" kern="1200"/>
+            <a:t>Stack</a:t>
+          </a:r>
+        </a:p>
+        <a:p>
+          <a:pPr marL="685800" lvl="3" indent="-228600" algn="l" defTabSz="1155700">
+            <a:lnSpc>
+              <a:spcPct val="90000"/>
+            </a:lnSpc>
+            <a:spcBef>
+              <a:spcPct val="0"/>
+            </a:spcBef>
+            <a:spcAft>
+              <a:spcPct val="15000"/>
+            </a:spcAft>
+            <a:buChar char="•"/>
+          </a:pPr>
+          <a:r>
+            <a:rPr lang="en-US" sz="2600" kern="1200"/>
+            <a:t>Linked list</a:t>
+          </a:r>
+        </a:p>
+        <a:p>
+          <a:pPr marL="228600" lvl="1" indent="-228600" algn="l" defTabSz="1155700">
+            <a:lnSpc>
+              <a:spcPct val="90000"/>
+            </a:lnSpc>
+            <a:spcBef>
+              <a:spcPct val="0"/>
+            </a:spcBef>
+            <a:spcAft>
+              <a:spcPct val="15000"/>
+            </a:spcAft>
+            <a:buChar char="•"/>
+          </a:pPr>
+          <a:r>
+            <a:rPr lang="en-US" sz="2600" kern="1200"/>
+            <a:t>Non-linear Data Structure</a:t>
+          </a:r>
+        </a:p>
+        <a:p>
+          <a:pPr marL="457200" lvl="2" indent="-228600" algn="l" defTabSz="1155700">
+            <a:lnSpc>
+              <a:spcPct val="90000"/>
+            </a:lnSpc>
+            <a:spcBef>
+              <a:spcPct val="0"/>
+            </a:spcBef>
+            <a:spcAft>
+              <a:spcPct val="15000"/>
+            </a:spcAft>
+            <a:buChar char="•"/>
+          </a:pPr>
+          <a:r>
+            <a:rPr lang="en-US" sz="2600" kern="1200"/>
+            <a:t>Tree data structure</a:t>
+          </a:r>
+        </a:p>
+        <a:p>
+          <a:pPr marL="457200" lvl="2" indent="-228600" algn="l" defTabSz="1155700">
+            <a:lnSpc>
+              <a:spcPct val="90000"/>
+            </a:lnSpc>
+            <a:spcBef>
+              <a:spcPct val="0"/>
+            </a:spcBef>
+            <a:spcAft>
+              <a:spcPct val="15000"/>
+            </a:spcAft>
+            <a:buChar char="•"/>
+          </a:pPr>
+          <a:r>
+            <a:rPr lang="en-US" sz="2600" kern="1200"/>
+            <a:t>Graph data structure</a:t>
+          </a:r>
+        </a:p>
+      </dsp:txBody>
+      <dsp:txXfrm>
+        <a:off x="0" y="461839"/>
+        <a:ext cx="6666833" cy="4914000"/>
+      </dsp:txXfrm>
+    </dsp:sp>
+    <dsp:sp modelId="{AFC28D6A-2691-4297-9AEF-EC9ECF939E0A}">
+      <dsp:nvSpPr>
+        <dsp:cNvPr id="0" name=""/>
+        <dsp:cNvSpPr/>
+      </dsp:nvSpPr>
+      <dsp:spPr>
+        <a:xfrm>
+          <a:off x="333341" y="78079"/>
+          <a:ext cx="4666783" cy="767520"/>
+        </a:xfrm>
+        <a:prstGeom prst="roundRect">
+          <a:avLst/>
+        </a:prstGeom>
+        <a:gradFill rotWithShape="0">
+          <a:gsLst>
+            <a:gs pos="0">
+              <a:schemeClr val="accent2">
+                <a:hueOff val="0"/>
+                <a:satOff val="0"/>
+                <a:lumOff val="0"/>
+                <a:alphaOff val="0"/>
+                <a:satMod val="103000"/>
+                <a:lumMod val="102000"/>
+                <a:tint val="94000"/>
+              </a:schemeClr>
+            </a:gs>
+            <a:gs pos="50000">
+              <a:schemeClr val="accent2">
+                <a:hueOff val="0"/>
+                <a:satOff val="0"/>
+                <a:lumOff val="0"/>
+                <a:alphaOff val="0"/>
+                <a:satMod val="110000"/>
+                <a:lumMod val="100000"/>
+                <a:shade val="100000"/>
+              </a:schemeClr>
+            </a:gs>
+            <a:gs pos="100000">
+              <a:schemeClr val="accent2">
+                <a:hueOff val="0"/>
+                <a:satOff val="0"/>
+                <a:lumOff val="0"/>
+                <a:alphaOff val="0"/>
+                <a:lumMod val="99000"/>
+                <a:satMod val="120000"/>
+                <a:shade val="78000"/>
+              </a:schemeClr>
+            </a:gs>
+          </a:gsLst>
+          <a:lin ang="5400000" scaled="0"/>
+        </a:gradFill>
+        <a:ln>
+          <a:noFill/>
+        </a:ln>
+        <a:effectLst/>
+      </dsp:spPr>
+      <dsp:style>
+        <a:lnRef idx="0">
+          <a:scrgbClr r="0" g="0" b="0"/>
+        </a:lnRef>
+        <a:fillRef idx="3">
+          <a:scrgbClr r="0" g="0" b="0"/>
+        </a:fillRef>
+        <a:effectRef idx="2">
+          <a:scrgbClr r="0" g="0" b="0"/>
+        </a:effectRef>
+        <a:fontRef idx="minor">
+          <a:schemeClr val="lt1"/>
+        </a:fontRef>
+      </dsp:style>
+      <dsp:txBody>
+        <a:bodyPr spcFirstLastPara="0" vert="horz" wrap="square" lIns="176393" tIns="0" rIns="176393" bIns="0" numCol="1" spcCol="1270" anchor="ctr" anchorCtr="0">
+          <a:noAutofit/>
+        </a:bodyPr>
+        <a:lstStyle/>
+        <a:p>
+          <a:pPr marL="0" lvl="0" indent="0" algn="l" defTabSz="1155700">
+            <a:lnSpc>
+              <a:spcPct val="90000"/>
+            </a:lnSpc>
+            <a:spcBef>
+              <a:spcPct val="0"/>
+            </a:spcBef>
+            <a:spcAft>
+              <a:spcPct val="35000"/>
+            </a:spcAft>
+            <a:buNone/>
+          </a:pPr>
+          <a:r>
+            <a:rPr lang="en-US" sz="2600" kern="1200"/>
+            <a:t>Data structure two types:</a:t>
+          </a:r>
+        </a:p>
+      </dsp:txBody>
+      <dsp:txXfrm>
+        <a:off x="370808" y="115546"/>
+        <a:ext cx="4591849" cy="692586"/>
+      </dsp:txXfrm>
+    </dsp:sp>
+  </dsp:spTree>
+</dsp:drawing>
+</file>
+
+<file path=ppt/diagrams/layout1.xml><?xml version="1.0" encoding="utf-8"?>
+<dgm:layoutDef xmlns:dgm="http://schemas.openxmlformats.org/drawingml/2006/diagram" xmlns:a="http://schemas.openxmlformats.org/drawingml/2006/main" uniqueId="urn:microsoft.com/office/officeart/2005/8/layout/list1">
+  <dgm:title val=""/>
+  <dgm:desc val=""/>
+  <dgm:catLst>
+    <dgm:cat type="list" pri="4000"/>
+  </dgm:catLst>
+  <dgm:sampData>
+    <dgm:dataModel>
+      <dgm:ptLst>
+        <dgm:pt modelId="0" type="doc"/>
+        <dgm:pt modelId="1">
+          <dgm:prSet phldr="1"/>
+        </dgm:pt>
+        <dgm:pt modelId="2">
+          <dgm:prSet phldr="1"/>
+        </dgm:pt>
+        <dgm:pt modelId="3">
+          <dgm:prSet phldr="1"/>
+        </dgm:pt>
+      </dgm:ptLst>
+      <dgm:cxnLst>
+        <dgm:cxn modelId="4" srcId="0" destId="1" srcOrd="0" destOrd="0"/>
+        <dgm:cxn modelId="5" srcId="0" destId="2" srcOrd="1" destOrd="0"/>
+        <dgm:cxn modelId="6" srcId="0" destId="3" srcOrd="2" destOrd="0"/>
+      </dgm:cxnLst>
+      <dgm:bg/>
+      <dgm:whole/>
+    </dgm:dataModel>
+  </dgm:sampData>
+  <dgm:styleData>
+    <dgm:dataModel>
+      <dgm:ptLst>
+        <dgm:pt modelId="0" type="doc"/>
+        <dgm:pt modelId="1"/>
+        <dgm:pt modelId="2"/>
+      </dgm:ptLst>
+      <dgm:cxnLst>
+        <dgm:cxn modelId="4" srcId="0" destId="1" srcOrd="0" destOrd="0"/>
+        <dgm:cxn modelId="5" srcId="0" destId="2" srcOrd="1" destOrd="0"/>
+      </dgm:cxnLst>
+      <dgm:bg/>
+      <dgm:whole/>
+    </dgm:dataModel>
+  </dgm:styleData>
+  <dgm:clrData>
+    <dgm:dataModel>
+      <dgm:ptLst>
+        <dgm:pt modelId="0" type="doc"/>
+        <dgm:pt modelId="1"/>
+        <dgm:pt modelId="2"/>
+        <dgm:pt modelId="3"/>
+        <dgm:pt modelId="4"/>
+      </dgm:ptLst>
+      <dgm:cxnLst>
+        <dgm:cxn modelId="5" srcId="0" destId="1" srcOrd="0" destOrd="0"/>
+        <dgm:cxn modelId="6" srcId="0" destId="2" srcOrd="1" destOrd="0"/>
+        <dgm:cxn modelId="7" srcId="0" destId="3" srcOrd="2" destOrd="0"/>
+        <dgm:cxn modelId="8" srcId="0" destId="4" srcOrd="3" destOrd="0"/>
+      </dgm:cxnLst>
+      <dgm:bg/>
+      <dgm:whole/>
+    </dgm:dataModel>
+  </dgm:clrData>
+  <dgm:layoutNode name="linear">
+    <dgm:varLst>
+      <dgm:dir/>
+      <dgm:animLvl val="lvl"/>
+      <dgm:resizeHandles val="exact"/>
+    </dgm:varLst>
+    <dgm:choose name="Name0">
+      <dgm:if name="Name1" func="var" arg="dir" op="equ" val="norm">
+        <dgm:alg type="lin">
+          <dgm:param type="linDir" val="fromT"/>
+          <dgm:param type="vertAlign" val="mid"/>
+          <dgm:param type="horzAlign" val="l"/>
+          <dgm:param type="nodeHorzAlign" val="l"/>
+        </dgm:alg>
+      </dgm:if>
+      <dgm:else name="Name2">
+        <dgm:alg type="lin">
+          <dgm:param type="linDir" val="fromT"/>
+          <dgm:param type="vertAlign" val="mid"/>
+          <dgm:param type="horzAlign" val="r"/>
+          <dgm:param type="nodeHorzAlign" val="r"/>
+        </dgm:alg>
+      </dgm:else>
+    </dgm:choose>
+    <dgm:shape xmlns:r="http://schemas.openxmlformats.org/officeDocument/2006/relationships" r:blip="">
+      <dgm:adjLst/>
+    </dgm:shape>
+    <dgm:presOf/>
+    <dgm:constrLst>
+      <dgm:constr type="w" for="ch" forName="parentLin" refType="w"/>
+      <dgm:constr type="h" for="ch" forName="parentLin" val="INF"/>
+      <dgm:constr type="w" for="des" forName="parentLeftMargin" refType="w" fact="0.05"/>
+      <dgm:constr type="w" for="des" forName="parentText" refType="w" fact="0.7"/>
+      <dgm:constr type="h" for="des" forName="parentText" refType="primFontSz" refFor="des" refForName="parentText" fact="0.82"/>
+      <dgm:constr type="h" for="ch" forName="negativeSpace" refType="primFontSz" refFor="des" refForName="parentText" fact="-0.41"/>
+      <dgm:constr type="h" for="ch" forName="negativeSpace" refType="h" refFor="des" refForName="parentText" op="lte" fact="-0.82"/>
+      <dgm:constr type="h" for="ch" forName="negativeSpace" refType="h" refFor="des" refForName="parentText" op="gte" fact="-0.82"/>
+      <dgm:constr type="w" for="ch" forName="childText" refType="w"/>
+      <dgm:constr type="h" for="ch" forName="childText" refType="primFontSz" refFor="des" refForName="parentText" fact="0.7"/>
+      <dgm:constr type="primFontSz" for="des" forName="parentText" val="65"/>
+      <dgm:constr type="primFontSz" for="ch" forName="childText" refType="primFontSz" refFor="des" refForName="parentText"/>
+      <dgm:constr type="tMarg" for="ch" forName="childText" refType="primFontSz" refFor="des" refForName="parentText" fact="1.64"/>
+      <dgm:constr type="tMarg" for="ch" forName="childText" refType="h" refFor="des" refForName="parentText" op="lte" fact="3.28"/>
+      <dgm:constr type="tMarg" for="ch" forName="childText" refType="h" refFor="des" refForName="parentText" op="gte" fact="3.28"/>
+      <dgm:constr type="lMarg" for="ch" forName="childText" refType="w" fact="0.22"/>
+      <dgm:constr type="rMarg" for="ch" forName="childText" refType="lMarg" refFor="ch" refForName="childText"/>
+      <dgm:constr type="lMarg" for="des" forName="parentText" refType="w" fact="0.075"/>
+      <dgm:constr type="rMarg" for="des" forName="parentText" refType="lMarg" refFor="des" refForName="parentText"/>
+      <dgm:constr type="h" for="ch" forName="spaceBetweenRectangles" refType="primFontSz" refFor="des" refForName="parentText" fact="0.15"/>
+    </dgm:constrLst>
+    <dgm:ruleLst>
+      <dgm:rule type="primFontSz" for="des" forName="parentText" val="5" fact="NaN" max="NaN"/>
+    </dgm:ruleLst>
+    <dgm:forEach name="Name3" axis="ch" ptType="node">
+      <dgm:layoutNode name="parentLin">
+        <dgm:choose name="Name4">
+          <dgm:if name="Name5" func="var" arg="dir" op="equ" val="norm">
+            <dgm:alg type="lin">
+              <dgm:param type="linDir" val="fromL"/>
+              <dgm:param type="horzAlign" val="l"/>
+              <dgm:param type="nodeHorzAlign" val="l"/>
+            </dgm:alg>
+          </dgm:if>
+          <dgm:else name="Name6">
+            <dgm:alg type="lin">
+              <dgm:param type="linDir" val="fromR"/>
+              <dgm:param type="horzAlign" val="r"/>
+              <dgm:param type="nodeHorzAlign" val="r"/>
+            </dgm:alg>
+          </dgm:else>
+        </dgm:choose>
+        <dgm:shape xmlns:r="http://schemas.openxmlformats.org/officeDocument/2006/relationships" r:blip="">
+          <dgm:adjLst/>
+        </dgm:shape>
+        <dgm:presOf/>
+        <dgm:constrLst/>
+        <dgm:ruleLst/>
+        <dgm:layoutNode name="parentLeftMargin">
+          <dgm:alg type="sp"/>
+          <dgm:shape xmlns:r="http://schemas.openxmlformats.org/officeDocument/2006/relationships" type="rect" r:blip="" hideGeom="1">
+            <dgm:adjLst/>
+          </dgm:shape>
+          <dgm:presOf axis="self"/>
+          <dgm:constrLst>
+            <dgm:constr type="h"/>
+          </dgm:constrLst>
+          <dgm:ruleLst/>
+        </dgm:layoutNode>
+        <dgm:layoutNode name="parentText" styleLbl="node1">
+          <dgm:varLst>
+            <dgm:chMax val="0"/>
+            <dgm:bulletEnabled val="1"/>
+          </dgm:varLst>
+          <dgm:choose name="Name7">
+            <dgm:if name="Name8" func="var" arg="dir" op="equ" val="norm">
+              <dgm:alg type="tx">
+                <dgm:param type="parTxLTRAlign" val="l"/>
+                <dgm:param type="parTxRTLAlign" val="l"/>
+              </dgm:alg>
+            </dgm:if>
+            <dgm:else name="Name9">
+              <dgm:alg type="tx">
+                <dgm:param type="parTxLTRAlign" val="r"/>
+                <dgm:param type="parTxRTLAlign" val="r"/>
+              </dgm:alg>
+            </dgm:else>
+          </dgm:choose>
+          <dgm:shape xmlns:r="http://schemas.openxmlformats.org/officeDocument/2006/relationships" type="roundRect" r:blip="">
+            <dgm:adjLst/>
+          </dgm:shape>
+          <dgm:presOf axis="self" ptType="node"/>
+          <dgm:constrLst>
+            <dgm:constr type="tMarg"/>
+            <dgm:constr type="bMarg"/>
+          </dgm:constrLst>
+          <dgm:ruleLst/>
+        </dgm:layoutNode>
+      </dgm:layoutNode>
+      <dgm:layoutNode name="negativeSpace">
+        <dgm:alg type="sp"/>
+        <dgm:shape xmlns:r="http://schemas.openxmlformats.org/officeDocument/2006/relationships" r:blip="">
+          <dgm:adjLst/>
+        </dgm:shape>
+        <dgm:presOf/>
+        <dgm:constrLst/>
+        <dgm:ruleLst/>
+      </dgm:layoutNode>
+      <dgm:layoutNode name="childText" styleLbl="conFgAcc1">
+        <dgm:varLst>
+          <dgm:bulletEnabled val="1"/>
+        </dgm:varLst>
+        <dgm:alg type="tx">
+          <dgm:param type="stBulletLvl" val="1"/>
+        </dgm:alg>
+        <dgm:shape xmlns:r="http://schemas.openxmlformats.org/officeDocument/2006/relationships" type="rect" r:blip="" zOrderOff="-2">
+          <dgm:adjLst/>
+        </dgm:shape>
+        <dgm:presOf axis="des" ptType="node"/>
+        <dgm:constrLst>
+          <dgm:constr type="secFontSz" refType="primFontSz"/>
+        </dgm:constrLst>
+        <dgm:ruleLst>
+          <dgm:rule type="h" val="INF" fact="NaN" max="NaN"/>
+        </dgm:ruleLst>
+      </dgm:layoutNode>
+      <dgm:forEach name="Name10" axis="followSib" ptType="sibTrans" cnt="1">
+        <dgm:layoutNode name="spaceBetweenRectangles">
+          <dgm:alg type="sp"/>
+          <dgm:shape xmlns:r="http://schemas.openxmlformats.org/officeDocument/2006/relationships" r:blip="">
+            <dgm:adjLst/>
+          </dgm:shape>
+          <dgm:presOf/>
+          <dgm:constrLst/>
+          <dgm:ruleLst/>
+        </dgm:layoutNode>
+      </dgm:forEach>
+    </dgm:forEach>
+  </dgm:layoutNode>
+</dgm:layoutDef>
+</file>
+
+<file path=ppt/diagrams/quickStyle1.xml><?xml version="1.0" encoding="utf-8"?>
+<dgm:styleDef xmlns:dgm="http://schemas.openxmlformats.org/drawingml/2006/diagram" xmlns:a="http://schemas.openxmlformats.org/drawingml/2006/main" uniqueId="urn:microsoft.com/office/officeart/2005/8/quickstyle/simple4">
+  <dgm:title val=""/>
+  <dgm:desc val=""/>
+  <dgm:catLst>
+    <dgm:cat type="simple" pri="10400"/>
+  </dgm:catLst>
+  <dgm:scene3d>
+    <a:camera prst="orthographicFront"/>
+    <a:lightRig rig="threePt" dir="t"/>
+  </dgm:scene3d>
+  <dgm:styleLbl name="node0">
+    <dgm:scene3d>
+      <a:camera prst="orthographicFront"/>
+      <a:lightRig rig="threePt" dir="t"/>
+    </dgm:scene3d>
+    <dgm:sp3d/>
+    <dgm:txPr/>
+    <dgm:style>
+      <a:lnRef idx="0">
+        <a:scrgbClr r="0" g="0" b="0"/>
+      </a:lnRef>
+      <a:fillRef idx="3">
+        <a:scrgbClr r="0" g="0" b="0"/>
+      </a:fillRef>
+      <a:effectRef idx="2">
+        <a:scrgbClr r="0" g="0" b="0"/>
+      </a:effectRef>
+      <a:fontRef idx="minor">
+        <a:schemeClr val="lt1"/>
+      </a:fontRef>
+    </dgm:style>
+  </dgm:styleLbl>
+  <dgm:styleLbl name="lnNode1">
+    <dgm:scene3d>
+      <a:camera prst="orthographicFront"/>
+      <a:lightRig rig="threePt" dir="t"/>
+    </dgm:scene3d>
+    <dgm:sp3d/>
+    <dgm:txPr/>
+    <dgm:style>
+      <a:lnRef idx="1">
+        <a:scrgbClr r="0" g="0" b="0"/>
+      </a:lnRef>
+      <a:fillRef idx="3">
+        <a:scrgbClr r="0" g="0" b="0"/>
+      </a:fillRef>
+      <a:effectRef idx="2">
+        <a:scrgbClr r="0" g="0" b="0"/>
+      </a:effectRef>
+      <a:fontRef idx="minor">
+        <a:schemeClr val="lt1"/>
+      </a:fontRef>
+    </dgm:style>
+  </dgm:styleLbl>
+  <dgm:styleLbl name="vennNode1">
+    <dgm:scene3d>
+      <a:camera prst="orthographicFront"/>
+      <a:lightRig rig="threePt" dir="t"/>
+    </dgm:scene3d>
+    <dgm:sp3d/>
+    <dgm:txPr/>
+    <dgm:style>
+      <a:lnRef idx="0">
+        <a:scrgbClr r="0" g="0" b="0"/>
+      </a:lnRef>
+      <a:fillRef idx="3">
+        <a:scrgbClr r="0" g="0" b="0"/>
+      </a:fillRef>
+      <a:effectRef idx="0">
+        <a:scrgbClr r="0" g="0" b="0"/>
+      </a:effectRef>
+      <a:fontRef idx="minor">
+        <a:schemeClr val="tx1"/>
+      </a:fontRef>
+    </dgm:style>
+  </dgm:styleLbl>
+  <dgm:styleLbl name="alignNode1">
+    <dgm:scene3d>
+      <a:camera prst="orthographicFront"/>
+      <a:lightRig rig="threePt" dir="t"/>
+    </dgm:scene3d>
+    <dgm:sp3d/>
+    <dgm:txPr/>
+    <dgm:style>
+      <a:lnRef idx="1">
+        <a:scrgbClr r="0" g="0" b="0"/>
+      </a:lnRef>
+      <a:fillRef idx="3">
+        <a:scrgbClr r="0" g="0" b="0"/>
+      </a:fillRef>
+      <a:effectRef idx="2">
+        <a:scrgbClr r="0" g="0" b="0"/>
+      </a:effectRef>
+      <a:fontRef idx="minor">
+        <a:schemeClr val="lt1"/>
+      </a:fontRef>
+    </dgm:style>
+  </dgm:styleLbl>
+  <dgm:styleLbl name="node1">
+    <dgm:scene3d>
+      <a:camera prst="orthographicFront"/>
+      <a:lightRig rig="threePt" dir="t"/>
+    </dgm:scene3d>
+    <dgm:sp3d/>
+    <dgm:txPr/>
+    <dgm:style>
+      <a:lnRef idx="0">
+        <a:scrgbClr r="0" g="0" b="0"/>
+      </a:lnRef>
+      <a:fillRef idx="3">
+        <a:scrgbClr r="0" g="0" b="0"/>
+      </a:fillRef>
+      <a:effectRef idx="2">
+        <a:scrgbClr r="0" g="0" b="0"/>
+      </a:effectRef>
+      <a:fontRef idx="minor">
+        <a:schemeClr val="lt1"/>
+      </a:fontRef>
+    </dgm:style>
+  </dgm:styleLbl>
+  <dgm:styleLbl name="node2">
+    <dgm:scene3d>
+      <a:camera prst="orthographicFront"/>
+      <a:lightRig rig="threePt" dir="t"/>
+    </dgm:scene3d>
+    <dgm:sp3d/>
+    <dgm:txPr/>
+    <dgm:style>
+      <a:lnRef idx="0">
+        <a:scrgbClr r="0" g="0" b="0"/>
+      </a:lnRef>
+      <a:fillRef idx="3">
+        <a:scrgbClr r="0" g="0" b="0"/>
+      </a:fillRef>
+      <a:effectRef idx="2">
+        <a:scrgbClr r="0" g="0" b="0"/>
+      </a:effectRef>
+      <a:fontRef idx="minor">
+        <a:schemeClr val="lt1"/>
+      </a:fontRef>
+    </dgm:style>
+  </dgm:styleLbl>
+  <dgm:styleLbl name="node3">
+    <dgm:scene3d>
+      <a:camera prst="orthographicFront"/>
+      <a:lightRig rig="threePt" dir="t"/>
+    </dgm:scene3d>
+    <dgm:sp3d/>
+    <dgm:txPr/>
+    <dgm:style>
+      <a:lnRef idx="0">
+        <a:scrgbClr r="0" g="0" b="0"/>
+      </a:lnRef>
+      <a:fillRef idx="3">
+        <a:scrgbClr r="0" g="0" b="0"/>
+      </a:fillRef>
+      <a:effectRef idx="2">
+        <a:scrgbClr r="0" g="0" b="0"/>
+      </a:effectRef>
+      <a:fontRef idx="minor">
+        <a:schemeClr val="lt1"/>
+      </a:fontRef>
+    </dgm:style>
+  </dgm:styleLbl>
+  <dgm:styleLbl name="node4">
+    <dgm:scene3d>
+      <a:camera prst="orthographicFront"/>
+      <a:lightRig rig="threePt" dir="t"/>
+    </dgm:scene3d>
+    <dgm:sp3d/>
+    <dgm:txPr/>
+    <dgm:style>
+      <a:lnRef idx="0">
+        <a:scrgbClr r="0" g="0" b="0"/>
+      </a:lnRef>
+      <a:fillRef idx="3">
+        <a:scrgbClr r="0" g="0" b="0"/>
+      </a:fillRef>
+      <a:effectRef idx="2">
+        <a:scrgbClr r="0" g="0" b="0"/>
+      </a:effectRef>
+      <a:fontRef idx="minor">
+        <a:schemeClr val="lt1"/>
+      </a:fontRef>
+    </dgm:style>
+  </dgm:styleLbl>
+  <dgm:styleLbl name="fgImgPlace1">
+    <dgm:scene3d>
+      <a:camera prst="orthographicFront"/>
+      <a:lightRig rig="threePt" dir="t"/>
+    </dgm:scene3d>
+    <dgm:sp3d/>
+    <dgm:txPr/>
+    <dgm:style>
+      <a:lnRef idx="0">
+        <a:scrgbClr r="0" g="0" b="0"/>
+      </a:lnRef>
+      <a:fillRef idx="1">
+        <a:scrgbClr r="0" g="0" b="0"/>
+      </a:fillRef>
+      <a:effectRef idx="2">
+        <a:scrgbClr r="0" g="0" b="0"/>
+      </a:effectRef>
+      <a:fontRef idx="minor"/>
+    </dgm:style>
+  </dgm:styleLbl>
+  <dgm:styleLbl name="alignImgPlace1">
+    <dgm:scene3d>
+      <a:camera prst="orthographicFront"/>
+      <a:lightRig rig="threePt" dir="t"/>
+    </dgm:scene3d>
+    <dgm:sp3d/>
+    <dgm:txPr/>
+    <dgm:style>
+      <a:lnRef idx="0">
+        <a:scrgbClr r="0" g="0" b="0"/>
+      </a:lnRef>
+      <a:fillRef idx="1">
+        <a:scrgbClr r="0" g="0" b="0"/>
+      </a:fillRef>
+      <a:effectRef idx="2">
+        <a:scrgbClr r="0" g="0" b="0"/>
+      </a:effectRef>
+      <a:fontRef idx="minor"/>
+    </dgm:style>
+  </dgm:styleLbl>
+  <dgm:styleLbl name="bgImgPlace1">
+    <dgm:scene3d>
+      <a:camera prst="orthographicFront"/>
+      <a:lightRig rig="threePt" dir="t"/>
+    </dgm:scene3d>
+    <dgm:sp3d/>
+    <dgm:txPr/>
+    <dgm:style>
+      <a:lnRef idx="0">
+        <a:scrgbClr r="0" g="0" b="0"/>
+      </a:lnRef>
+      <a:fillRef idx="1">
+        <a:scrgbClr r="0" g="0" b="0"/>
+      </a:fillRef>
+      <a:effectRef idx="2">
+        <a:scrgbClr r="0" g="0" b="0"/>
+      </a:effectRef>
+      <a:fontRef idx="minor"/>
+    </dgm:style>
+  </dgm:styleLbl>
+  <dgm:styleLbl name="sibTrans2D1">
+    <dgm:scene3d>
+      <a:camera prst="orthographicFront"/>
+      <a:lightRig rig="threePt" dir="t"/>
+    </dgm:scene3d>
+    <dgm:sp3d/>
+    <dgm:txPr/>
+    <dgm:style>
+      <a:lnRef idx="0">
+        <a:scrgbClr r="0" g="0" b="0"/>
+      </a:lnRef>
+      <a:fillRef idx="3">
+        <a:scrgbClr r="0" g="0" b="0"/>
+      </a:fillRef>
+      <a:effectRef idx="2">
+        <a:scrgbClr r="0" g="0" b="0"/>
+      </a:effectRef>
+      <a:fontRef idx="minor">
+        <a:schemeClr val="lt1"/>
+      </a:fontRef>
+    </dgm:style>
+  </dgm:styleLbl>
+  <dgm:styleLbl name="fgSibTrans2D1">
+    <dgm:scene3d>
+      <a:camera prst="orthographicFront"/>
+      <a:lightRig rig="threePt" dir="t"/>
+    </dgm:scene3d>
+    <dgm:sp3d/>
+    <dgm:txPr/>
+    <dgm:style>
+      <a:lnRef idx="0">
+        <a:scrgbClr r="0" g="0" b="0"/>
+      </a:lnRef>
+      <a:fillRef idx="3">
+        <a:scrgbClr r="0" g="0" b="0"/>
+      </a:fillRef>
+      <a:effectRef idx="2">
+        <a:scrgbClr r="0" g="0" b="0"/>
+      </a:effectRef>
+      <a:fontRef idx="minor">
+        <a:schemeClr val="lt1"/>
+      </a:fontRef>
+    </dgm:style>
+  </dgm:styleLbl>
+  <dgm:styleLbl name="bgSibTrans2D1">
+    <dgm:scene3d>
+      <a:camera prst="orthographicFront"/>
+      <a:lightRig rig="threePt" dir="t"/>
+    </dgm:scene3d>
+    <dgm:sp3d/>
+    <dgm:txPr/>
+    <dgm:style>
+      <a:lnRef idx="0">
+        <a:scrgbClr r="0" g="0" b="0"/>
+      </a:lnRef>
+      <a:fillRef idx="3">
+        <a:scrgbClr r="0" g="0" b="0"/>
+      </a:fillRef>
+      <a:effectRef idx="2">
+        <a:scrgbClr r="0" g="0" b="0"/>
+      </a:effectRef>
+      <a:fontRef idx="minor">
+        <a:schemeClr val="lt1"/>
+      </a:fontRef>
+    </dgm:style>
+  </dgm:styleLbl>
+  <dgm:styleLbl name="sibTrans1D1">
+    <dgm:scene3d>
+      <a:camera prst="orthographicFront"/>
+      <a:lightRig rig="threePt" dir="t"/>
+    </dgm:scene3d>
+    <dgm:sp3d/>
+    <dgm:txPr/>
+    <dgm:style>
+      <a:lnRef idx="1">
+        <a:scrgbClr r="0" g="0" b="0"/>
+      </a:lnRef>
+      <a:fillRef idx="0">
+        <a:scrgbClr r="0" g="0" b="0"/>
+      </a:fillRef>
+      <a:effectRef idx="0">
+        <a:scrgbClr r="0" g="0" b="0"/>
+      </a:effectRef>
+      <a:fontRef idx="minor"/>
+    </dgm:style>
+  </dgm:styleLbl>
+  <dgm:styleLbl name="callout">
+    <dgm:scene3d>
+      <a:camera prst="orthographicFront"/>
+      <a:lightRig rig="threePt" dir="t"/>
+    </dgm:scene3d>
+    <dgm:sp3d/>
+    <dgm:txPr/>
+    <dgm:style>
+      <a:lnRef idx="2">
+        <a:scrgbClr r="0" g="0" b="0"/>
+      </a:lnRef>
+      <a:fillRef idx="1">
+        <a:scrgbClr r="0" g="0" b="0"/>
+      </a:fillRef>
+      <a:effectRef idx="1">
+        <a:scrgbClr r="0" g="0" b="0"/>
+      </a:effectRef>
+      <a:fontRef idx="minor"/>
+    </dgm:style>
+  </dgm:styleLbl>
+  <dgm:styleLbl name="asst0">
+    <dgm:scene3d>
+      <a:camera prst="orthographicFront"/>
+      <a:lightRig rig="threePt" dir="t"/>
+    </dgm:scene3d>
+    <dgm:sp3d/>
+    <dgm:txPr/>
+    <dgm:style>
+      <a:lnRef idx="0">
+        <a:scrgbClr r="0" g="0" b="0"/>
+      </a:lnRef>
+      <a:fillRef idx="3">
+        <a:scrgbClr r="0" g="0" b="0"/>
+      </a:fillRef>
+      <a:effectRef idx="2">
+        <a:scrgbClr r="0" g="0" b="0"/>
+      </a:effectRef>
+      <a:fontRef idx="minor">
+        <a:schemeClr val="lt1"/>
+      </a:fontRef>
+    </dgm:style>
+  </dgm:styleLbl>
+  <dgm:styleLbl name="asst1">
+    <dgm:scene3d>
+      <a:camera prst="orthographicFront"/>
+      <a:lightRig rig="threePt" dir="t"/>
+    </dgm:scene3d>
+    <dgm:sp3d/>
+    <dgm:txPr/>
+    <dgm:style>
+      <a:lnRef idx="0">
+        <a:scrgbClr r="0" g="0" b="0"/>
+      </a:lnRef>
+      <a:fillRef idx="3">
+        <a:scrgbClr r="0" g="0" b="0"/>
+      </a:fillRef>
+      <a:effectRef idx="2">
+        <a:scrgbClr r="0" g="0" b="0"/>
+      </a:effectRef>
+      <a:fontRef idx="minor">
+        <a:schemeClr val="lt1"/>
+      </a:fontRef>
+    </dgm:style>
+  </dgm:styleLbl>
+  <dgm:styleLbl name="asst2">
+    <dgm:scene3d>
+      <a:camera prst="orthographicFront"/>
+      <a:lightRig rig="threePt" dir="t"/>
+    </dgm:scene3d>
+    <dgm:sp3d/>
+    <dgm:txPr/>
+    <dgm:style>
+      <a:lnRef idx="0">
+        <a:scrgbClr r="0" g="0" b="0"/>
+      </a:lnRef>
+      <a:fillRef idx="3">
+        <a:scrgbClr r="0" g="0" b="0"/>
+      </a:fillRef>
+      <a:effectRef idx="2">
+        <a:scrgbClr r="0" g="0" b="0"/>
+      </a:effectRef>
+      <a:fontRef idx="minor">
+        <a:schemeClr val="lt1"/>
+      </a:fontRef>
+    </dgm:style>
+  </dgm:styleLbl>
+  <dgm:styleLbl name="asst3">
+    <dgm:scene3d>
+      <a:camera prst="orthographicFront"/>
+      <a:lightRig rig="threePt" dir="t"/>
+    </dgm:scene3d>
+    <dgm:sp3d/>
+    <dgm:txPr/>
+    <dgm:style>
+      <a:lnRef idx="0">
+        <a:scrgbClr r="0" g="0" b="0"/>
+      </a:lnRef>
+      <a:fillRef idx="3">
+        <a:scrgbClr r="0" g="0" b="0"/>
+      </a:fillRef>
+      <a:effectRef idx="2">
+        <a:scrgbClr r="0" g="0" b="0"/>
+      </a:effectRef>
+      <a:fontRef idx="minor">
+        <a:schemeClr val="lt1"/>
+      </a:fontRef>
+    </dgm:style>
+  </dgm:styleLbl>
+  <dgm:styleLbl name="asst4">
+    <dgm:scene3d>
+      <a:camera prst="orthographicFront"/>
+      <a:lightRig rig="threePt" dir="t"/>
+    </dgm:scene3d>
+    <dgm:sp3d/>
+    <dgm:txPr/>
+    <dgm:style>
+      <a:lnRef idx="0">
+        <a:scrgbClr r="0" g="0" b="0"/>
+      </a:lnRef>
+      <a:fillRef idx="3">
+        <a:scrgbClr r="0" g="0" b="0"/>
+      </a:fillRef>
+      <a:effectRef idx="2">
+        <a:scrgbClr r="0" g="0" b="0"/>
+      </a:effectRef>
+      <a:fontRef idx="minor">
+        <a:schemeClr val="lt1"/>
+      </a:fontRef>
+    </dgm:style>
+  </dgm:styleLbl>
+  <dgm:styleLbl name="parChTrans2D1">
+    <dgm:scene3d>
+      <a:camera prst="orthographicFront"/>
+      <a:lightRig rig="threePt" dir="t"/>
+    </dgm:scene3d>
+    <dgm:sp3d/>
+    <dgm:txPr/>
+    <dgm:style>
+      <a:lnRef idx="0">
+        <a:scrgbClr r="0" g="0" b="0"/>
+      </a:lnRef>
+      <a:fillRef idx="3">
+        <a:scrgbClr r="0" g="0" b="0"/>
+      </a:fillRef>
+      <a:effectRef idx="2">
+        <a:scrgbClr r="0" g="0" b="0"/>
+      </a:effectRef>
+      <a:fontRef idx="minor">
+        <a:schemeClr val="lt1"/>
+      </a:fontRef>
+    </dgm:style>
+  </dgm:styleLbl>
+  <dgm:styleLbl name="parChTrans2D2">
+    <dgm:scene3d>
+      <a:camera prst="orthographicFront"/>
+      <a:lightRig rig="threePt" dir="t"/>
+    </dgm:scene3d>
+    <dgm:sp3d/>
+    <dgm:txPr/>
+    <dgm:style>
+      <a:lnRef idx="0">
+        <a:scrgbClr r="0" g="0" b="0"/>
+      </a:lnRef>
+      <a:fillRef idx="3">
+        <a:scrgbClr r="0" g="0" b="0"/>
+      </a:fillRef>
+      <a:effectRef idx="2">
+        <a:scrgbClr r="0" g="0" b="0"/>
+      </a:effectRef>
+      <a:fontRef idx="minor">
+        <a:schemeClr val="lt1"/>
+      </a:fontRef>
+    </dgm:style>
+  </dgm:styleLbl>
+  <dgm:styleLbl name="parChTrans2D3">
+    <dgm:scene3d>
+      <a:camera prst="orthographicFront"/>
+      <a:lightRig rig="threePt" dir="t"/>
+    </dgm:scene3d>
+    <dgm:sp3d/>
+    <dgm:txPr/>
+    <dgm:style>
+      <a:lnRef idx="1">
+        <a:scrgbClr r="0" g="0" b="0"/>
+      </a:lnRef>
+      <a:fillRef idx="3">
+        <a:scrgbClr r="0" g="0" b="0"/>
+      </a:fillRef>
+      <a:effectRef idx="2">
+        <a:scrgbClr r="0" g="0" b="0"/>
+      </a:effectRef>
+      <a:fontRef idx="minor">
+        <a:schemeClr val="lt1"/>
+      </a:fontRef>
+    </dgm:style>
+  </dgm:styleLbl>
+  <dgm:styleLbl name="parChTrans2D4">
+    <dgm:scene3d>
+      <a:camera prst="orthographicFront"/>
+      <a:lightRig rig="threePt" dir="t"/>
+    </dgm:scene3d>
+    <dgm:sp3d/>
+    <dgm:txPr/>
+    <dgm:style>
+      <a:lnRef idx="1">
+        <a:scrgbClr r="0" g="0" b="0"/>
+      </a:lnRef>
+      <a:fillRef idx="3">
+        <a:scrgbClr r="0" g="0" b="0"/>
+      </a:fillRef>
+      <a:effectRef idx="2">
+        <a:scrgbClr r="0" g="0" b="0"/>
+      </a:effectRef>
+      <a:fontRef idx="minor">
+        <a:schemeClr val="lt1"/>
+      </a:fontRef>
+    </dgm:style>
+  </dgm:styleLbl>
+  <dgm:styleLbl name="parChTrans1D1">
+    <dgm:scene3d>
+      <a:camera prst="orthographicFront"/>
+      <a:lightRig rig="threePt" dir="t"/>
+    </dgm:scene3d>
+    <dgm:sp3d/>
+    <dgm:txPr/>
+    <dgm:style>
+      <a:lnRef idx="1">
+        <a:scrgbClr r="0" g="0" b="0"/>
+      </a:lnRef>
+      <a:fillRef idx="0">
+        <a:scrgbClr r="0" g="0" b="0"/>
+      </a:fillRef>
+      <a:effectRef idx="0">
+        <a:scrgbClr r="0" g="0" b="0"/>
+      </a:effectRef>
+      <a:fontRef idx="minor"/>
+    </dgm:style>
+  </dgm:styleLbl>
+  <dgm:styleLbl name="parChTrans1D2">
+    <dgm:scene3d>
+      <a:camera prst="orthographicFront"/>
+      <a:lightRig rig="threePt" dir="t"/>
+    </dgm:scene3d>
+    <dgm:sp3d/>
+    <dgm:txPr/>
+    <dgm:style>
+      <a:lnRef idx="1">
+        <a:scrgbClr r="0" g="0" b="0"/>
+      </a:lnRef>
+      <a:fillRef idx="0">
+        <a:scrgbClr r="0" g="0" b="0"/>
+      </a:fillRef>
+      <a:effectRef idx="0">
+        <a:scrgbClr r="0" g="0" b="0"/>
+      </a:effectRef>
+      <a:fontRef idx="minor"/>
+    </dgm:style>
+  </dgm:styleLbl>
+  <dgm:styleLbl name="parChTrans1D3">
+    <dgm:scene3d>
+      <a:camera prst="orthographicFront"/>
+      <a:lightRig rig="threePt" dir="t"/>
+    </dgm:scene3d>
+    <dgm:sp3d/>
+    <dgm:txPr/>
+    <dgm:style>
+      <a:lnRef idx="1">
+        <a:scrgbClr r="0" g="0" b="0"/>
+      </a:lnRef>
+      <a:fillRef idx="0">
+        <a:scrgbClr r="0" g="0" b="0"/>
+      </a:fillRef>
+      <a:effectRef idx="0">
+        <a:scrgbClr r="0" g="0" b="0"/>
+      </a:effectRef>
+      <a:fontRef idx="minor"/>
+    </dgm:style>
+  </dgm:styleLbl>
+  <dgm:styleLbl name="parChTrans1D4">
+    <dgm:scene3d>
+      <a:camera prst="orthographicFront"/>
+      <a:lightRig rig="threePt" dir="t"/>
+    </dgm:scene3d>
+    <dgm:sp3d/>
+    <dgm:txPr/>
+    <dgm:style>
+      <a:lnRef idx="1">
+        <a:scrgbClr r="0" g="0" b="0"/>
+      </a:lnRef>
+      <a:fillRef idx="0">
+        <a:scrgbClr r="0" g="0" b="0"/>
+      </a:fillRef>
+      <a:effectRef idx="0">
+        <a:scrgbClr r="0" g="0" b="0"/>
+      </a:effectRef>
+      <a:fontRef idx="minor"/>
+    </dgm:style>
+  </dgm:styleLbl>
+  <dgm:styleLbl name="fgAcc1">
+    <dgm:scene3d>
+      <a:camera prst="orthographicFront"/>
+      <a:lightRig rig="threePt" dir="t"/>
+    </dgm:scene3d>
+    <dgm:sp3d/>
+    <dgm:txPr/>
+    <dgm:style>
+      <a:lnRef idx="1">
+        <a:scrgbClr r="0" g="0" b="0"/>
+      </a:lnRef>
+      <a:fillRef idx="1">
+        <a:scrgbClr r="0" g="0" b="0"/>
+      </a:fillRef>
+      <a:effectRef idx="0">
+        <a:scrgbClr r="0" g="0" b="0"/>
+      </a:effectRef>
+      <a:fontRef idx="minor"/>
+    </dgm:style>
+  </dgm:styleLbl>
+  <dgm:styleLbl name="conFgAcc1">
+    <dgm:scene3d>
+      <a:camera prst="orthographicFront"/>
+      <a:lightRig rig="threePt" dir="t"/>
+    </dgm:scene3d>
+    <dgm:sp3d/>
+    <dgm:txPr/>
+    <dgm:style>
+      <a:lnRef idx="1">
+        <a:scrgbClr r="0" g="0" b="0"/>
+      </a:lnRef>
+      <a:fillRef idx="1">
+        <a:scrgbClr r="0" g="0" b="0"/>
+      </a:fillRef>
+      <a:effectRef idx="0">
+        <a:scrgbClr r="0" g="0" b="0"/>
+      </a:effectRef>
+      <a:fontRef idx="minor"/>
+    </dgm:style>
+  </dgm:styleLbl>
+  <dgm:styleLbl name="alignAcc1">
+    <dgm:scene3d>
+      <a:camera prst="orthographicFront"/>
+      <a:lightRig rig="threePt" dir="t"/>
+    </dgm:scene3d>
+    <dgm:sp3d/>
+    <dgm:txPr/>
+    <dgm:style>
+      <a:lnRef idx="1">
+        <a:scrgbClr r="0" g="0" b="0"/>
+      </a:lnRef>
+      <a:fillRef idx="1">
+        <a:scrgbClr r="0" g="0" b="0"/>
+      </a:fillRef>
+      <a:effectRef idx="0">
+        <a:scrgbClr r="0" g="0" b="0"/>
+      </a:effectRef>
+      <a:fontRef idx="minor"/>
+    </dgm:style>
+  </dgm:styleLbl>
+  <dgm:styleLbl name="trAlignAcc1">
+    <dgm:scene3d>
+      <a:camera prst="orthographicFront"/>
+      <a:lightRig rig="threePt" dir="t"/>
+    </dgm:scene3d>
+    <dgm:sp3d/>
+    <dgm:txPr/>
+    <dgm:style>
+      <a:lnRef idx="1">
+        <a:scrgbClr r="0" g="0" b="0"/>
+      </a:lnRef>
+      <a:fillRef idx="1">
+        <a:scrgbClr r="0" g="0" b="0"/>
+      </a:fillRef>
+      <a:effectRef idx="0">
+        <a:scrgbClr r="0" g="0" b="0"/>
+      </a:effectRef>
+      <a:fontRef idx="minor"/>
+    </dgm:style>
+  </dgm:styleLbl>
+  <dgm:styleLbl name="bgAcc1">
+    <dgm:scene3d>
+      <a:camera prst="orthographicFront"/>
+      <a:lightRig rig="threePt" dir="t"/>
+    </dgm:scene3d>
+    <dgm:sp3d/>
+    <dgm:txPr/>
+    <dgm:style>
+      <a:lnRef idx="1">
+        <a:scrgbClr r="0" g="0" b="0"/>
+      </a:lnRef>
+      <a:fillRef idx="1">
+        <a:scrgbClr r="0" g="0" b="0"/>
+      </a:fillRef>
+      <a:effectRef idx="0">
+        <a:scrgbClr r="0" g="0" b="0"/>
+      </a:effectRef>
+      <a:fontRef idx="minor"/>
+    </dgm:style>
+  </dgm:styleLbl>
+  <dgm:styleLbl name="solidFgAcc1">
+    <dgm:scene3d>
+      <a:camera prst="orthographicFront"/>
+      <a:lightRig rig="threePt" dir="t"/>
+    </dgm:scene3d>
+    <dgm:sp3d/>
+    <dgm:txPr/>
+    <dgm:style>
+      <a:lnRef idx="1">
+        <a:scrgbClr r="0" g="0" b="0"/>
+      </a:lnRef>
+      <a:fillRef idx="1">
+        <a:scrgbClr r="0" g="0" b="0"/>
+      </a:fillRef>
+      <a:effectRef idx="0">
+        <a:scrgbClr r="0" g="0" b="0"/>
+      </a:effectRef>
+      <a:fontRef idx="minor"/>
+    </dgm:style>
+  </dgm:styleLbl>
+  <dgm:styleLbl name="solidAlignAcc1">
+    <dgm:scene3d>
+      <a:camera prst="orthographicFront"/>
+      <a:lightRig rig="threePt" dir="t"/>
+    </dgm:scene3d>
+    <dgm:sp3d/>
+    <dgm:txPr/>
+    <dgm:style>
+      <a:lnRef idx="1">
+        <a:scrgbClr r="0" g="0" b="0"/>
+      </a:lnRef>
+      <a:fillRef idx="1">
+        <a:scrgbClr r="0" g="0" b="0"/>
+      </a:fillRef>
+      <a:effectRef idx="0">
+        <a:scrgbClr r="0" g="0" b="0"/>
+      </a:effectRef>
+      <a:fontRef idx="minor"/>
+    </dgm:style>
+  </dgm:styleLbl>
+  <dgm:styleLbl name="solidBgAcc1">
+    <dgm:scene3d>
+      <a:camera prst="orthographicFront"/>
+      <a:lightRig rig="threePt" dir="t"/>
+    </dgm:scene3d>
+    <dgm:sp3d/>
+    <dgm:txPr/>
+    <dgm:style>
+      <a:lnRef idx="1">
+        <a:scrgbClr r="0" g="0" b="0"/>
+      </a:lnRef>
+      <a:fillRef idx="1">
+        <a:scrgbClr r="0" g="0" b="0"/>
+      </a:fillRef>
+      <a:effectRef idx="0">
+        <a:scrgbClr r="0" g="0" b="0"/>
+      </a:effectRef>
+      <a:fontRef idx="minor"/>
+    </dgm:style>
+  </dgm:styleLbl>
+  <dgm:styleLbl name="fgAccFollowNode1">
+    <dgm:scene3d>
+      <a:camera prst="orthographicFront"/>
+      <a:lightRig rig="threePt" dir="t"/>
+    </dgm:scene3d>
+    <dgm:sp3d/>
+    <dgm:txPr/>
+    <dgm:style>
+      <a:lnRef idx="1">
+        <a:scrgbClr r="0" g="0" b="0"/>
+      </a:lnRef>
+      <a:fillRef idx="1">
+        <a:scrgbClr r="0" g="0" b="0"/>
+      </a:fillRef>
+      <a:effectRef idx="0">
+        <a:scrgbClr r="0" g="0" b="0"/>
+      </a:effectRef>
+      <a:fontRef idx="minor"/>
+    </dgm:style>
+  </dgm:styleLbl>
+  <dgm:styleLbl name="alignAccFollowNode1">
+    <dgm:scene3d>
+      <a:camera prst="orthographicFront"/>
+      <a:lightRig rig="threePt" dir="t"/>
+    </dgm:scene3d>
+    <dgm:sp3d/>
+    <dgm:txPr/>
+    <dgm:style>
+      <a:lnRef idx="1">
+        <a:scrgbClr r="0" g="0" b="0"/>
+      </a:lnRef>
+      <a:fillRef idx="1">
+        <a:scrgbClr r="0" g="0" b="0"/>
+      </a:fillRef>
+      <a:effectRef idx="0">
+        <a:scrgbClr r="0" g="0" b="0"/>
+      </a:effectRef>
+      <a:fontRef idx="minor"/>
+    </dgm:style>
+  </dgm:styleLbl>
+  <dgm:styleLbl name="bgAccFollowNode1">
+    <dgm:scene3d>
+      <a:camera prst="orthographicFront"/>
+      <a:lightRig rig="threePt" dir="t"/>
+    </dgm:scene3d>
+    <dgm:sp3d/>
+    <dgm:txPr/>
+    <dgm:style>
+      <a:lnRef idx="1">
+        <a:scrgbClr r="0" g="0" b="0"/>
+      </a:lnRef>
+      <a:fillRef idx="1">
+        <a:scrgbClr r="0" g="0" b="0"/>
+      </a:fillRef>
+      <a:effectRef idx="0">
+        <a:scrgbClr r="0" g="0" b="0"/>
+      </a:effectRef>
+      <a:fontRef idx="minor"/>
+    </dgm:style>
+  </dgm:styleLbl>
+  <dgm:styleLbl name="fgAcc0">
+    <dgm:scene3d>
+      <a:camera prst="orthographicFront"/>
+      <a:lightRig rig="threePt" dir="t"/>
+    </dgm:scene3d>
+    <dgm:sp3d/>
+    <dgm:txPr/>
+    <dgm:style>
+      <a:lnRef idx="1">
+        <a:scrgbClr r="0" g="0" b="0"/>
+      </a:lnRef>
+      <a:fillRef idx="1">
+        <a:scrgbClr r="0" g="0" b="0"/>
+      </a:fillRef>
+      <a:effectRef idx="0">
+        <a:scrgbClr r="0" g="0" b="0"/>
+      </a:effectRef>
+      <a:fontRef idx="minor"/>
+    </dgm:style>
+  </dgm:styleLbl>
+  <dgm:styleLbl name="fgAcc2">
+    <dgm:scene3d>
+      <a:camera prst="orthographicFront"/>
+      <a:lightRig rig="threePt" dir="t"/>
+    </dgm:scene3d>
+    <dgm:sp3d/>
+    <dgm:txPr/>
+    <dgm:style>
+      <a:lnRef idx="1">
+        <a:scrgbClr r="0" g="0" b="0"/>
+      </a:lnRef>
+      <a:fillRef idx="1">
+        <a:scrgbClr r="0" g="0" b="0"/>
+      </a:fillRef>
+      <a:effectRef idx="0">
+        <a:scrgbClr r="0" g="0" b="0"/>
+      </a:effectRef>
+      <a:fontRef idx="minor"/>
+    </dgm:style>
+  </dgm:styleLbl>
+  <dgm:styleLbl name="fgAcc3">
+    <dgm:scene3d>
+      <a:camera prst="orthographicFront"/>
+      <a:lightRig rig="threePt" dir="t"/>
+    </dgm:scene3d>
+    <dgm:sp3d/>
+    <dgm:txPr/>
+    <dgm:style>
+      <a:lnRef idx="1">
+        <a:scrgbClr r="0" g="0" b="0"/>
+      </a:lnRef>
+      <a:fillRef idx="1">
+        <a:scrgbClr r="0" g="0" b="0"/>
+      </a:fillRef>
+      <a:effectRef idx="0">
+        <a:scrgbClr r="0" g="0" b="0"/>
+      </a:effectRef>
+      <a:fontRef idx="minor"/>
+    </dgm:style>
+  </dgm:styleLbl>
+  <dgm:styleLbl name="fgAcc4">
+    <dgm:scene3d>
+      <a:camera prst="orthographicFront"/>
+      <a:lightRig rig="threePt" dir="t"/>
+    </dgm:scene3d>
+    <dgm:sp3d/>
+    <dgm:txPr/>
+    <dgm:style>
+      <a:lnRef idx="1">
+        <a:scrgbClr r="0" g="0" b="0"/>
+      </a:lnRef>
+      <a:fillRef idx="1">
+        <a:scrgbClr r="0" g="0" b="0"/>
+      </a:fillRef>
+      <a:effectRef idx="0">
+        <a:scrgbClr r="0" g="0" b="0"/>
+      </a:effectRef>
+      <a:fontRef idx="minor"/>
+    </dgm:style>
+  </dgm:styleLbl>
+  <dgm:styleLbl name="bgShp">
+    <dgm:scene3d>
+      <a:camera prst="orthographicFront"/>
+      <a:lightRig rig="threePt" dir="t"/>
+    </dgm:scene3d>
+    <dgm:sp3d/>
+    <dgm:txPr/>
+    <dgm:style>
+      <a:lnRef idx="0">
+        <a:scrgbClr r="0" g="0" b="0"/>
+      </a:lnRef>
+      <a:fillRef idx="1">
+        <a:scrgbClr r="0" g="0" b="0"/>
+      </a:fillRef>
+      <a:effectRef idx="2">
+        <a:scrgbClr r="0" g="0" b="0"/>
+      </a:effectRef>
+      <a:fontRef idx="minor"/>
+    </dgm:style>
+  </dgm:styleLbl>
+  <dgm:styleLbl name="dkBgShp">
+    <dgm:scene3d>
+      <a:camera prst="orthographicFront"/>
+      <a:lightRig rig="threePt" dir="t"/>
+    </dgm:scene3d>
+    <dgm:sp3d/>
+    <dgm:txPr/>
+    <dgm:style>
+      <a:lnRef idx="0">
+        <a:scrgbClr r="0" g="0" b="0"/>
+      </a:lnRef>
+      <a:fillRef idx="1">
+        <a:scrgbClr r="0" g="0" b="0"/>
+      </a:fillRef>
+      <a:effectRef idx="2">
+        <a:scrgbClr r="0" g="0" b="0"/>
+      </a:effectRef>
+      <a:fontRef idx="minor"/>
+    </dgm:style>
+  </dgm:styleLbl>
+  <dgm:styleLbl name="trBgShp">
+    <dgm:scene3d>
+      <a:camera prst="orthographicFront"/>
+      <a:lightRig rig="threePt" dir="t"/>
+    </dgm:scene3d>
+    <dgm:sp3d/>
+    <dgm:txPr/>
+    <dgm:style>
+      <a:lnRef idx="0">
+        <a:scrgbClr r="0" g="0" b="0"/>
+      </a:lnRef>
+      <a:fillRef idx="1">
+        <a:scrgbClr r="0" g="0" b="0"/>
+      </a:fillRef>
+      <a:effectRef idx="0">
+        <a:scrgbClr r="0" g="0" b="0"/>
+      </a:effectRef>
+      <a:fontRef idx="minor"/>
+    </dgm:style>
+  </dgm:styleLbl>
+  <dgm:styleLbl name="fgShp">
+    <dgm:scene3d>
+      <a:camera prst="orthographicFront"/>
+      <a:lightRig rig="threePt" dir="t"/>
+    </dgm:scene3d>
+    <dgm:sp3d/>
+    <dgm:txPr/>
+    <dgm:style>
+      <a:lnRef idx="0">
+        <a:scrgbClr r="0" g="0" b="0"/>
+      </a:lnRef>
+      <a:fillRef idx="3">
+        <a:scrgbClr r="0" g="0" b="0"/>
+      </a:fillRef>
+      <a:effectRef idx="2">
+        <a:scrgbClr r="0" g="0" b="0"/>
+      </a:effectRef>
+      <a:fontRef idx="minor"/>
+    </dgm:style>
+  </dgm:styleLbl>
+  <dgm:styleLbl name="revTx">
+    <dgm:scene3d>
+      <a:camera prst="orthographicFront"/>
+      <a:lightRig rig="threePt" dir="t"/>
+    </dgm:scene3d>
+    <dgm:sp3d/>
+    <dgm:txPr/>
+    <dgm:style>
+      <a:lnRef idx="0">
+        <a:scrgbClr r="0" g="0" b="0"/>
+      </a:lnRef>
+      <a:fillRef idx="0">
+        <a:scrgbClr r="0" g="0" b="0"/>
+      </a:fillRef>
+      <a:effectRef idx="0">
+        <a:scrgbClr r="0" g="0" b="0"/>
+      </a:effectRef>
+      <a:fontRef idx="minor"/>
+    </dgm:style>
+  </dgm:styleLbl>
+</dgm:styleDef>
+</file>
+
 <file path=ppt/slideLayouts/slideLayout1.xml><?xml version="1.0" encoding="utf-8"?>
 <p:sldLayout xmlns:a="http://schemas.openxmlformats.org/drawingml/2006/main" xmlns:r="http://schemas.openxmlformats.org/officeDocument/2006/relationships" xmlns:p="http://schemas.openxmlformats.org/presentationml/2006/main" type="title" preserve="1">
   <p:cSld name="Title Slide">
@@ -269,7 +3151,7 @@
           <a:p>
             <a:fld id="{1140D365-4777-40C3-A677-A04F761BF0D4}" type="datetimeFigureOut">
               <a:rPr lang="en-US" smtClean="0"/>
-              <a:t>9/6/2024</a:t>
+              <a:t>7/17/2025</a:t>
             </a:fld>
             <a:endParaRPr lang="en-US"/>
           </a:p>
@@ -467,7 +3349,7 @@
           <a:p>
             <a:fld id="{1140D365-4777-40C3-A677-A04F761BF0D4}" type="datetimeFigureOut">
               <a:rPr lang="en-US" smtClean="0"/>
-              <a:t>9/6/2024</a:t>
+              <a:t>7/17/2025</a:t>
             </a:fld>
             <a:endParaRPr lang="en-US"/>
           </a:p>
@@ -675,7 +3557,7 @@
           <a:p>
             <a:fld id="{1140D365-4777-40C3-A677-A04F761BF0D4}" type="datetimeFigureOut">
               <a:rPr lang="en-US" smtClean="0"/>
-              <a:t>9/6/2024</a:t>
+              <a:t>7/17/2025</a:t>
             </a:fld>
             <a:endParaRPr lang="en-US"/>
           </a:p>
@@ -873,7 +3755,7 @@
           <a:p>
             <a:fld id="{1140D365-4777-40C3-A677-A04F761BF0D4}" type="datetimeFigureOut">
               <a:rPr lang="en-US" smtClean="0"/>
-              <a:t>9/6/2024</a:t>
+              <a:t>7/17/2025</a:t>
             </a:fld>
             <a:endParaRPr lang="en-US"/>
           </a:p>
@@ -1148,7 +4030,7 @@
           <a:p>
             <a:fld id="{1140D365-4777-40C3-A677-A04F761BF0D4}" type="datetimeFigureOut">
               <a:rPr lang="en-US" smtClean="0"/>
-              <a:t>9/6/2024</a:t>
+              <a:t>7/17/2025</a:t>
             </a:fld>
             <a:endParaRPr lang="en-US"/>
           </a:p>
@@ -1413,7 +4295,7 @@
           <a:p>
             <a:fld id="{1140D365-4777-40C3-A677-A04F761BF0D4}" type="datetimeFigureOut">
               <a:rPr lang="en-US" smtClean="0"/>
-              <a:t>9/6/2024</a:t>
+              <a:t>7/17/2025</a:t>
             </a:fld>
             <a:endParaRPr lang="en-US"/>
           </a:p>
@@ -1825,7 +4707,7 @@
           <a:p>
             <a:fld id="{1140D365-4777-40C3-A677-A04F761BF0D4}" type="datetimeFigureOut">
               <a:rPr lang="en-US" smtClean="0"/>
-              <a:t>9/6/2024</a:t>
+              <a:t>7/17/2025</a:t>
             </a:fld>
             <a:endParaRPr lang="en-US"/>
           </a:p>
@@ -1966,7 +4848,7 @@
           <a:p>
             <a:fld id="{1140D365-4777-40C3-A677-A04F761BF0D4}" type="datetimeFigureOut">
               <a:rPr lang="en-US" smtClean="0"/>
-              <a:t>9/6/2024</a:t>
+              <a:t>7/17/2025</a:t>
             </a:fld>
             <a:endParaRPr lang="en-US"/>
           </a:p>
@@ -2079,7 +4961,7 @@
           <a:p>
             <a:fld id="{1140D365-4777-40C3-A677-A04F761BF0D4}" type="datetimeFigureOut">
               <a:rPr lang="en-US" smtClean="0"/>
-              <a:t>9/6/2024</a:t>
+              <a:t>7/17/2025</a:t>
             </a:fld>
             <a:endParaRPr lang="en-US"/>
           </a:p>
@@ -2390,7 +5272,7 @@
           <a:p>
             <a:fld id="{1140D365-4777-40C3-A677-A04F761BF0D4}" type="datetimeFigureOut">
               <a:rPr lang="en-US" smtClean="0"/>
-              <a:t>9/6/2024</a:t>
+              <a:t>7/17/2025</a:t>
             </a:fld>
             <a:endParaRPr lang="en-US"/>
           </a:p>
@@ -2678,7 +5560,7 @@
           <a:p>
             <a:fld id="{1140D365-4777-40C3-A677-A04F761BF0D4}" type="datetimeFigureOut">
               <a:rPr lang="en-US" smtClean="0"/>
-              <a:t>9/6/2024</a:t>
+              <a:t>7/17/2025</a:t>
             </a:fld>
             <a:endParaRPr lang="en-US"/>
           </a:p>
@@ -2919,7 +5801,7 @@
           <a:p>
             <a:fld id="{1140D365-4777-40C3-A677-A04F761BF0D4}" type="datetimeFigureOut">
               <a:rPr lang="en-US" smtClean="0"/>
-              <a:t>9/6/2024</a:t>
+              <a:t>7/17/2025</a:t>
             </a:fld>
             <a:endParaRPr lang="en-US"/>
           </a:p>
@@ -4932,6 +7814,14 @@
 <file path=ppt/slides/slide6.xml><?xml version="1.0" encoding="utf-8"?>
 <p:sld xmlns:a="http://schemas.openxmlformats.org/drawingml/2006/main" xmlns:r="http://schemas.openxmlformats.org/officeDocument/2006/relationships" xmlns:p="http://schemas.openxmlformats.org/presentationml/2006/main">
   <p:cSld>
+    <p:bg>
+      <p:bgPr>
+        <a:solidFill>
+          <a:schemeClr val="bg1"/>
+        </a:solidFill>
+        <a:effectLst/>
+      </p:bgPr>
+    </p:bg>
     <p:spTree>
       <p:nvGrpSpPr>
         <p:cNvPr id="1" name=""/>
@@ -4946,6 +7836,552 @@
           <a:chExt cx="0" cy="0"/>
         </a:xfrm>
       </p:grpSpPr>
+      <p:sp useBgFill="1">
+        <p:nvSpPr>
+          <p:cNvPr id="13" name="Rectangle 12">
+            <a:extLst>
+              <a:ext uri="{FF2B5EF4-FFF2-40B4-BE49-F238E27FC236}">
+                <a16:creationId xmlns:a16="http://schemas.microsoft.com/office/drawing/2014/main" id="{BACC6370-2D7E-4714-9D71-7542949D7D5D}"/>
+              </a:ext>
+              <a:ext uri="{C183D7F6-B498-43B3-948B-1728B52AA6E4}">
+                <adec:decorative xmlns:adec="http://schemas.microsoft.com/office/drawing/2017/decorative" val="1"/>
+              </a:ext>
+            </a:extLst>
+          </p:cNvPr>
+          <p:cNvSpPr>
+            <a:spLocks noGrp="1" noRot="1" noChangeAspect="1" noMove="1" noResize="1" noEditPoints="1" noAdjustHandles="1" noChangeArrowheads="1" noChangeShapeType="1" noTextEdit="1"/>
+          </p:cNvSpPr>
+          <p:nvPr>
+            <p:extLst>
+              <p:ext uri="{386F3935-93C4-4BCD-93E2-E3B085C9AB24}">
+                <p16:designElem xmlns:p16="http://schemas.microsoft.com/office/powerpoint/2015/main" val="1"/>
+              </p:ext>
+            </p:extLst>
+          </p:nvPr>
+        </p:nvSpPr>
+        <p:spPr>
+          <a:xfrm>
+            <a:off x="0" y="0"/>
+            <a:ext cx="12192000" cy="6858000"/>
+          </a:xfrm>
+          <a:prstGeom prst="rect">
+            <a:avLst/>
+          </a:prstGeom>
+          <a:ln w="12700" cap="flat" cmpd="sng" algn="ctr">
+            <a:noFill/>
+            <a:prstDash val="solid"/>
+            <a:miter lim="800000"/>
+          </a:ln>
+          <a:effectLst/>
+          <a:extLst>
+            <a:ext uri="{91240B29-F687-4F45-9708-019B960494DF}">
+              <a14:hiddenLine xmlns:a14="http://schemas.microsoft.com/office/drawing/2010/main" w="12700" cap="flat" cmpd="sng" algn="ctr">
+                <a:solidFill>
+                  <a:schemeClr val="accent1">
+                    <a:shade val="50000"/>
+                  </a:schemeClr>
+                </a:solidFill>
+                <a:prstDash val="solid"/>
+                <a:miter lim="800000"/>
+              </a14:hiddenLine>
+            </a:ext>
+          </a:extLst>
+        </p:spPr>
+        <p:style>
+          <a:lnRef idx="2">
+            <a:schemeClr val="accent1">
+              <a:shade val="50000"/>
+            </a:schemeClr>
+          </a:lnRef>
+          <a:fillRef idx="1">
+            <a:schemeClr val="accent1"/>
+          </a:fillRef>
+          <a:effectRef idx="0">
+            <a:schemeClr val="accent1"/>
+          </a:effectRef>
+          <a:fontRef idx="minor">
+            <a:schemeClr val="lt1"/>
+          </a:fontRef>
+        </p:style>
+        <p:txBody>
+          <a:bodyPr rtlCol="0" anchor="ctr"/>
+          <a:lstStyle/>
+          <a:p>
+            <a:pPr algn="ctr"/>
+            <a:endParaRPr lang="en-US"/>
+          </a:p>
+        </p:txBody>
+      </p:sp>
+      <p:sp>
+        <p:nvSpPr>
+          <p:cNvPr id="15" name="Rectangle 14">
+            <a:extLst>
+              <a:ext uri="{FF2B5EF4-FFF2-40B4-BE49-F238E27FC236}">
+                <a16:creationId xmlns:a16="http://schemas.microsoft.com/office/drawing/2014/main" id="{256B2C21-A230-48C0-8DF1-C46611373C44}"/>
+              </a:ext>
+              <a:ext uri="{C183D7F6-B498-43B3-948B-1728B52AA6E4}">
+                <adec:decorative xmlns:adec="http://schemas.microsoft.com/office/drawing/2017/decorative" val="1"/>
+              </a:ext>
+            </a:extLst>
+          </p:cNvPr>
+          <p:cNvSpPr>
+            <a:spLocks noGrp="1" noRot="1" noChangeAspect="1" noMove="1" noResize="1" noEditPoints="1" noAdjustHandles="1" noChangeArrowheads="1" noChangeShapeType="1" noTextEdit="1"/>
+          </p:cNvSpPr>
+          <p:nvPr>
+            <p:extLst>
+              <p:ext uri="{386F3935-93C4-4BCD-93E2-E3B085C9AB24}">
+                <p16:designElem xmlns:p16="http://schemas.microsoft.com/office/powerpoint/2015/main" val="1"/>
+              </p:ext>
+            </p:extLst>
+          </p:nvPr>
+        </p:nvSpPr>
+        <p:spPr>
+          <a:xfrm rot="5400000" flipH="1">
+            <a:off x="-1410084" y="1410082"/>
+            <a:ext cx="6858000" cy="4037836"/>
+          </a:xfrm>
+          <a:prstGeom prst="rect">
+            <a:avLst/>
+          </a:prstGeom>
+          <a:gradFill>
+            <a:gsLst>
+              <a:gs pos="8000">
+                <a:srgbClr val="000000"/>
+              </a:gs>
+              <a:gs pos="100000">
+                <a:schemeClr val="accent1">
+                  <a:lumMod val="75000"/>
+                </a:schemeClr>
+              </a:gs>
+            </a:gsLst>
+            <a:lin ang="3000000" scaled="0"/>
+          </a:gradFill>
+          <a:ln>
+            <a:noFill/>
+          </a:ln>
+        </p:spPr>
+        <p:style>
+          <a:lnRef idx="2">
+            <a:schemeClr val="accent1">
+              <a:shade val="50000"/>
+            </a:schemeClr>
+          </a:lnRef>
+          <a:fillRef idx="1">
+            <a:schemeClr val="accent1"/>
+          </a:fillRef>
+          <a:effectRef idx="0">
+            <a:schemeClr val="accent1"/>
+          </a:effectRef>
+          <a:fontRef idx="minor">
+            <a:schemeClr val="lt1"/>
+          </a:fontRef>
+        </p:style>
+        <p:txBody>
+          <a:bodyPr rtlCol="0" anchor="ctr"/>
+          <a:lstStyle/>
+          <a:p>
+            <a:pPr algn="ctr"/>
+            <a:endParaRPr lang="en-US"/>
+          </a:p>
+        </p:txBody>
+      </p:sp>
+      <p:sp>
+        <p:nvSpPr>
+          <p:cNvPr id="17" name="Rectangle 16">
+            <a:extLst>
+              <a:ext uri="{FF2B5EF4-FFF2-40B4-BE49-F238E27FC236}">
+                <a16:creationId xmlns:a16="http://schemas.microsoft.com/office/drawing/2014/main" id="{3847E18C-932D-4C95-AABA-FEC7C9499AD7}"/>
+              </a:ext>
+              <a:ext uri="{C183D7F6-B498-43B3-948B-1728B52AA6E4}">
+                <adec:decorative xmlns:adec="http://schemas.microsoft.com/office/drawing/2017/decorative" val="1"/>
+              </a:ext>
+            </a:extLst>
+          </p:cNvPr>
+          <p:cNvSpPr>
+            <a:spLocks noGrp="1" noRot="1" noChangeAspect="1" noMove="1" noResize="1" noEditPoints="1" noAdjustHandles="1" noChangeArrowheads="1" noChangeShapeType="1" noTextEdit="1"/>
+          </p:cNvSpPr>
+          <p:nvPr>
+            <p:extLst>
+              <p:ext uri="{386F3935-93C4-4BCD-93E2-E3B085C9AB24}">
+                <p16:designElem xmlns:p16="http://schemas.microsoft.com/office/powerpoint/2015/main" val="1"/>
+              </p:ext>
+            </p:extLst>
+          </p:nvPr>
+        </p:nvSpPr>
+        <p:spPr>
+          <a:xfrm rot="5400000" flipH="1">
+            <a:off x="-1410085" y="1420219"/>
+            <a:ext cx="6857999" cy="4037839"/>
+          </a:xfrm>
+          <a:prstGeom prst="rect">
+            <a:avLst/>
+          </a:prstGeom>
+          <a:gradFill>
+            <a:gsLst>
+              <a:gs pos="0">
+                <a:srgbClr val="000000">
+                  <a:alpha val="0"/>
+                </a:srgbClr>
+              </a:gs>
+              <a:gs pos="99000">
+                <a:schemeClr val="accent1">
+                  <a:alpha val="46000"/>
+                </a:schemeClr>
+              </a:gs>
+            </a:gsLst>
+            <a:lin ang="1800000" scaled="0"/>
+          </a:gradFill>
+          <a:ln>
+            <a:noFill/>
+          </a:ln>
+        </p:spPr>
+        <p:style>
+          <a:lnRef idx="2">
+            <a:schemeClr val="accent1">
+              <a:shade val="50000"/>
+            </a:schemeClr>
+          </a:lnRef>
+          <a:fillRef idx="1">
+            <a:schemeClr val="accent1"/>
+          </a:fillRef>
+          <a:effectRef idx="0">
+            <a:schemeClr val="accent1"/>
+          </a:effectRef>
+          <a:fontRef idx="minor">
+            <a:schemeClr val="lt1"/>
+          </a:fontRef>
+        </p:style>
+        <p:txBody>
+          <a:bodyPr rtlCol="0" anchor="ctr"/>
+          <a:lstStyle/>
+          <a:p>
+            <a:pPr algn="ctr"/>
+            <a:endParaRPr lang="en-US"/>
+          </a:p>
+        </p:txBody>
+      </p:sp>
+      <p:sp>
+        <p:nvSpPr>
+          <p:cNvPr id="19" name="Rectangle 18">
+            <a:extLst>
+              <a:ext uri="{FF2B5EF4-FFF2-40B4-BE49-F238E27FC236}">
+                <a16:creationId xmlns:a16="http://schemas.microsoft.com/office/drawing/2014/main" id="{3150CB11-0C61-439E-910F-5787759E72A0}"/>
+              </a:ext>
+              <a:ext uri="{C183D7F6-B498-43B3-948B-1728B52AA6E4}">
+                <adec:decorative xmlns:adec="http://schemas.microsoft.com/office/drawing/2017/decorative" val="1"/>
+              </a:ext>
+            </a:extLst>
+          </p:cNvPr>
+          <p:cNvSpPr>
+            <a:spLocks noGrp="1" noRot="1" noChangeAspect="1" noMove="1" noResize="1" noEditPoints="1" noAdjustHandles="1" noChangeArrowheads="1" noChangeShapeType="1" noTextEdit="1"/>
+          </p:cNvSpPr>
+          <p:nvPr>
+            <p:extLst>
+              <p:ext uri="{386F3935-93C4-4BCD-93E2-E3B085C9AB24}">
+                <p16:designElem xmlns:p16="http://schemas.microsoft.com/office/powerpoint/2015/main" val="1"/>
+              </p:ext>
+            </p:extLst>
+          </p:nvPr>
+        </p:nvSpPr>
+        <p:spPr>
+          <a:xfrm rot="5400000" flipH="1">
+            <a:off x="767923" y="3588085"/>
+            <a:ext cx="2501979" cy="4037841"/>
+          </a:xfrm>
+          <a:prstGeom prst="rect">
+            <a:avLst/>
+          </a:prstGeom>
+          <a:gradFill>
+            <a:gsLst>
+              <a:gs pos="2000">
+                <a:schemeClr val="accent1">
+                  <a:alpha val="29000"/>
+                </a:schemeClr>
+              </a:gs>
+              <a:gs pos="100000">
+                <a:srgbClr val="000000">
+                  <a:alpha val="30000"/>
+                </a:srgbClr>
+              </a:gs>
+            </a:gsLst>
+            <a:lin ang="7800000" scaled="0"/>
+          </a:gradFill>
+          <a:ln>
+            <a:noFill/>
+          </a:ln>
+        </p:spPr>
+        <p:style>
+          <a:lnRef idx="2">
+            <a:schemeClr val="accent1">
+              <a:shade val="50000"/>
+            </a:schemeClr>
+          </a:lnRef>
+          <a:fillRef idx="1">
+            <a:schemeClr val="accent1"/>
+          </a:fillRef>
+          <a:effectRef idx="0">
+            <a:schemeClr val="accent1"/>
+          </a:effectRef>
+          <a:fontRef idx="minor">
+            <a:schemeClr val="lt1"/>
+          </a:fontRef>
+        </p:style>
+        <p:txBody>
+          <a:bodyPr rtlCol="0" anchor="ctr"/>
+          <a:lstStyle/>
+          <a:p>
+            <a:pPr algn="ctr"/>
+            <a:endParaRPr lang="en-US" dirty="0"/>
+          </a:p>
+        </p:txBody>
+      </p:sp>
+      <p:sp>
+        <p:nvSpPr>
+          <p:cNvPr id="21" name="Freeform: Shape 20">
+            <a:extLst>
+              <a:ext uri="{FF2B5EF4-FFF2-40B4-BE49-F238E27FC236}">
+                <a16:creationId xmlns:a16="http://schemas.microsoft.com/office/drawing/2014/main" id="{43F8A58B-5155-44CE-A5FF-7647B47D0A7A}"/>
+              </a:ext>
+              <a:ext uri="{C183D7F6-B498-43B3-948B-1728B52AA6E4}">
+                <adec:decorative xmlns:adec="http://schemas.microsoft.com/office/drawing/2017/decorative" val="1"/>
+              </a:ext>
+            </a:extLst>
+          </p:cNvPr>
+          <p:cNvSpPr>
+            <a:spLocks noGrp="1" noRot="1" noChangeAspect="1" noMove="1" noResize="1" noEditPoints="1" noAdjustHandles="1" noChangeArrowheads="1" noChangeShapeType="1" noTextEdit="1"/>
+          </p:cNvSpPr>
+          <p:nvPr>
+            <p:extLst>
+              <p:ext uri="{386F3935-93C4-4BCD-93E2-E3B085C9AB24}">
+                <p16:designElem xmlns:p16="http://schemas.microsoft.com/office/powerpoint/2015/main" val="1"/>
+              </p:ext>
+            </p:extLst>
+          </p:nvPr>
+        </p:nvSpPr>
+        <p:spPr>
+          <a:xfrm rot="20635413">
+            <a:off x="-501737" y="969718"/>
+            <a:ext cx="3900357" cy="4178958"/>
+          </a:xfrm>
+          <a:custGeom>
+            <a:avLst/>
+            <a:gdLst>
+              <a:gd name="connsiteX0" fmla="*/ 2432225 w 3900357"/>
+              <a:gd name="connsiteY0" fmla="*/ 93939 h 4178958"/>
+              <a:gd name="connsiteX1" fmla="*/ 3900357 w 3900357"/>
+              <a:gd name="connsiteY1" fmla="*/ 2089479 h 4178958"/>
+              <a:gd name="connsiteX2" fmla="*/ 1810878 w 3900357"/>
+              <a:gd name="connsiteY2" fmla="*/ 4178958 h 4178958"/>
+              <a:gd name="connsiteX3" fmla="*/ 78249 w 3900357"/>
+              <a:gd name="connsiteY3" fmla="*/ 3257727 h 4178958"/>
+              <a:gd name="connsiteX4" fmla="*/ 0 w 3900357"/>
+              <a:gd name="connsiteY4" fmla="*/ 3128923 h 4178958"/>
+              <a:gd name="connsiteX5" fmla="*/ 831324 w 3900357"/>
+              <a:gd name="connsiteY5" fmla="*/ 244281 h 4178958"/>
+              <a:gd name="connsiteX6" fmla="*/ 997559 w 3900357"/>
+              <a:gd name="connsiteY6" fmla="*/ 164202 h 4178958"/>
+              <a:gd name="connsiteX7" fmla="*/ 1810878 w 3900357"/>
+              <a:gd name="connsiteY7" fmla="*/ 0 h 4178958"/>
+              <a:gd name="connsiteX8" fmla="*/ 2432225 w 3900357"/>
+              <a:gd name="connsiteY8" fmla="*/ 93939 h 4178958"/>
+            </a:gdLst>
+            <a:ahLst/>
+            <a:cxnLst>
+              <a:cxn ang="0">
+                <a:pos x="connsiteX0" y="connsiteY0"/>
+              </a:cxn>
+              <a:cxn ang="0">
+                <a:pos x="connsiteX1" y="connsiteY1"/>
+              </a:cxn>
+              <a:cxn ang="0">
+                <a:pos x="connsiteX2" y="connsiteY2"/>
+              </a:cxn>
+              <a:cxn ang="0">
+                <a:pos x="connsiteX3" y="connsiteY3"/>
+              </a:cxn>
+              <a:cxn ang="0">
+                <a:pos x="connsiteX4" y="connsiteY4"/>
+              </a:cxn>
+              <a:cxn ang="0">
+                <a:pos x="connsiteX5" y="connsiteY5"/>
+              </a:cxn>
+              <a:cxn ang="0">
+                <a:pos x="connsiteX6" y="connsiteY6"/>
+              </a:cxn>
+              <a:cxn ang="0">
+                <a:pos x="connsiteX7" y="connsiteY7"/>
+              </a:cxn>
+              <a:cxn ang="0">
+                <a:pos x="connsiteX8" y="connsiteY8"/>
+              </a:cxn>
+            </a:cxnLst>
+            <a:rect l="l" t="t" r="r" b="b"/>
+            <a:pathLst>
+              <a:path w="3900357" h="4178958">
+                <a:moveTo>
+                  <a:pt x="2432225" y="93939"/>
+                </a:moveTo>
+                <a:cubicBezTo>
+                  <a:pt x="3282786" y="358491"/>
+                  <a:pt x="3900357" y="1151865"/>
+                  <a:pt x="3900357" y="2089479"/>
+                </a:cubicBezTo>
+                <a:cubicBezTo>
+                  <a:pt x="3900357" y="3243466"/>
+                  <a:pt x="2964865" y="4178958"/>
+                  <a:pt x="1810878" y="4178958"/>
+                </a:cubicBezTo>
+                <a:cubicBezTo>
+                  <a:pt x="1089636" y="4178958"/>
+                  <a:pt x="453744" y="3813531"/>
+                  <a:pt x="78249" y="3257727"/>
+                </a:cubicBezTo>
+                <a:lnTo>
+                  <a:pt x="0" y="3128923"/>
+                </a:lnTo>
+                <a:lnTo>
+                  <a:pt x="831324" y="244281"/>
+                </a:lnTo>
+                <a:lnTo>
+                  <a:pt x="997559" y="164202"/>
+                </a:lnTo>
+                <a:cubicBezTo>
+                  <a:pt x="1247540" y="58468"/>
+                  <a:pt x="1522381" y="0"/>
+                  <a:pt x="1810878" y="0"/>
+                </a:cubicBezTo>
+                <a:cubicBezTo>
+                  <a:pt x="2027251" y="0"/>
+                  <a:pt x="2235942" y="32888"/>
+                  <a:pt x="2432225" y="93939"/>
+                </a:cubicBezTo>
+                <a:close/>
+              </a:path>
+            </a:pathLst>
+          </a:custGeom>
+          <a:gradFill>
+            <a:gsLst>
+              <a:gs pos="29000">
+                <a:srgbClr val="000000">
+                  <a:alpha val="0"/>
+                </a:srgbClr>
+              </a:gs>
+              <a:gs pos="100000">
+                <a:schemeClr val="accent1">
+                  <a:alpha val="43000"/>
+                </a:schemeClr>
+              </a:gs>
+            </a:gsLst>
+            <a:lin ang="1800000" scaled="0"/>
+          </a:gradFill>
+          <a:ln>
+            <a:noFill/>
+          </a:ln>
+        </p:spPr>
+        <p:style>
+          <a:lnRef idx="2">
+            <a:schemeClr val="accent1">
+              <a:shade val="50000"/>
+            </a:schemeClr>
+          </a:lnRef>
+          <a:fillRef idx="1">
+            <a:schemeClr val="accent1"/>
+          </a:fillRef>
+          <a:effectRef idx="0">
+            <a:schemeClr val="accent1"/>
+          </a:effectRef>
+          <a:fontRef idx="minor">
+            <a:schemeClr val="lt1"/>
+          </a:fontRef>
+        </p:style>
+        <p:txBody>
+          <a:bodyPr wrap="square" rtlCol="0" anchor="ctr">
+            <a:noAutofit/>
+          </a:bodyPr>
+          <a:lstStyle/>
+          <a:p>
+            <a:pPr algn="ctr"/>
+            <a:endParaRPr lang="en-US" dirty="0"/>
+          </a:p>
+        </p:txBody>
+      </p:sp>
+      <p:sp>
+        <p:nvSpPr>
+          <p:cNvPr id="23" name="Rectangle 22">
+            <a:extLst>
+              <a:ext uri="{FF2B5EF4-FFF2-40B4-BE49-F238E27FC236}">
+                <a16:creationId xmlns:a16="http://schemas.microsoft.com/office/drawing/2014/main" id="{443F2ACA-E6D6-4028-82DD-F03C262D5DE6}"/>
+              </a:ext>
+              <a:ext uri="{C183D7F6-B498-43B3-948B-1728B52AA6E4}">
+                <adec:decorative xmlns:adec="http://schemas.microsoft.com/office/drawing/2017/decorative" val="1"/>
+              </a:ext>
+            </a:extLst>
+          </p:cNvPr>
+          <p:cNvSpPr>
+            <a:spLocks noGrp="1" noRot="1" noChangeAspect="1" noMove="1" noResize="1" noEditPoints="1" noAdjustHandles="1" noChangeArrowheads="1" noChangeShapeType="1" noTextEdit="1"/>
+          </p:cNvSpPr>
+          <p:nvPr>
+            <p:extLst>
+              <p:ext uri="{386F3935-93C4-4BCD-93E2-E3B085C9AB24}">
+                <p16:designElem xmlns:p16="http://schemas.microsoft.com/office/powerpoint/2015/main" val="1"/>
+              </p:ext>
+            </p:extLst>
+          </p:nvPr>
+        </p:nvSpPr>
+        <p:spPr>
+          <a:xfrm rot="5400000" flipH="1">
+            <a:off x="-1410095" y="1410079"/>
+            <a:ext cx="6858003" cy="4037835"/>
+          </a:xfrm>
+          <a:prstGeom prst="rect">
+            <a:avLst/>
+          </a:prstGeom>
+          <a:gradFill>
+            <a:gsLst>
+              <a:gs pos="0">
+                <a:srgbClr val="000000">
+                  <a:alpha val="0"/>
+                </a:srgbClr>
+              </a:gs>
+              <a:gs pos="99000">
+                <a:schemeClr val="accent1">
+                  <a:lumMod val="60000"/>
+                  <a:lumOff val="40000"/>
+                  <a:alpha val="11000"/>
+                </a:schemeClr>
+              </a:gs>
+            </a:gsLst>
+            <a:lin ang="7200000" scaled="0"/>
+          </a:gradFill>
+          <a:ln>
+            <a:noFill/>
+          </a:ln>
+        </p:spPr>
+        <p:style>
+          <a:lnRef idx="2">
+            <a:schemeClr val="accent1">
+              <a:shade val="50000"/>
+            </a:schemeClr>
+          </a:lnRef>
+          <a:fillRef idx="1">
+            <a:schemeClr val="accent1"/>
+          </a:fillRef>
+          <a:effectRef idx="0">
+            <a:schemeClr val="accent1"/>
+          </a:effectRef>
+          <a:fontRef idx="minor">
+            <a:schemeClr val="lt1"/>
+          </a:fontRef>
+        </p:style>
+        <p:txBody>
+          <a:bodyPr rtlCol="0" anchor="ctr"/>
+          <a:lstStyle/>
+          <a:p>
+            <a:pPr algn="ctr"/>
+            <a:endParaRPr lang="en-US"/>
+          </a:p>
+        </p:txBody>
+      </p:sp>
       <p:sp>
         <p:nvSpPr>
           <p:cNvPr id="7" name="Title 1">
@@ -4962,15 +8398,15 @@
         </p:nvSpPr>
         <p:spPr>
           <a:xfrm>
-            <a:off x="1724466" y="379974"/>
-            <a:ext cx="6673948" cy="893226"/>
+            <a:off x="586478" y="1683756"/>
+            <a:ext cx="3115265" cy="2396359"/>
           </a:xfrm>
           <a:prstGeom prst="rect">
             <a:avLst/>
           </a:prstGeom>
         </p:spPr>
         <p:txBody>
-          <a:bodyPr vert="horz" lIns="91440" tIns="45720" rIns="91440" bIns="45720" rtlCol="0" anchor="ctr">
+          <a:bodyPr vert="horz" lIns="91440" tIns="45720" rIns="91440" bIns="45720" rtlCol="0" anchor="b">
             <a:normAutofit/>
           </a:bodyPr>
           <a:lstStyle>
@@ -4993,67 +8429,57 @@
             </a:lvl1pPr>
           </a:lstStyle>
           <a:p>
-            <a:r>
-              <a:rPr lang="en-US" sz="2800" b="1" dirty="0">
-                <a:latin typeface="Arial" panose="020B0604020202020204" pitchFamily="34" charset="0"/>
-                <a:cs typeface="Arial" panose="020B0604020202020204" pitchFamily="34" charset="0"/>
+            <a:pPr algn="r">
+              <a:spcAft>
+                <a:spcPts val="600"/>
+              </a:spcAft>
+            </a:pPr>
+            <a:r>
+              <a:rPr lang="en-US" sz="4000" b="1" kern="1200">
+                <a:solidFill>
+                  <a:srgbClr val="FFFFFF"/>
+                </a:solidFill>
+                <a:latin typeface="+mj-lt"/>
+                <a:ea typeface="+mj-ea"/>
+                <a:cs typeface="+mj-cs"/>
               </a:rPr>
               <a:t>Types of data structure?</a:t>
             </a:r>
           </a:p>
         </p:txBody>
       </p:sp>
-      <p:pic>
-        <p:nvPicPr>
-          <p:cNvPr id="1026" name="Picture 2" descr="Lightbox">
+      <p:graphicFrame>
+        <p:nvGraphicFramePr>
+          <p:cNvPr id="9" name="Content Placeholder 2">
             <a:extLst>
               <a:ext uri="{FF2B5EF4-FFF2-40B4-BE49-F238E27FC236}">
-                <a16:creationId xmlns:a16="http://schemas.microsoft.com/office/drawing/2014/main" id="{34445336-CBC9-4FB6-B3C4-0DC7DCEE9D2A}"/>
+                <a16:creationId xmlns:a16="http://schemas.microsoft.com/office/drawing/2014/main" id="{7252D519-AC9E-9243-637D-2EF680AF52B4}"/>
               </a:ext>
             </a:extLst>
           </p:cNvPr>
-          <p:cNvPicPr>
-            <a:picLocks noChangeAspect="1" noChangeArrowheads="1"/>
-          </p:cNvPicPr>
-          <p:nvPr/>
-        </p:nvPicPr>
-        <p:blipFill>
-          <a:blip r:embed="rId2">
-            <a:extLst>
-              <a:ext uri="{28A0092B-C50C-407E-A947-70E740481C1C}">
-                <a14:useLocalDpi xmlns:a14="http://schemas.microsoft.com/office/drawing/2010/main" val="0"/>
-              </a:ext>
-            </a:extLst>
-          </a:blip>
-          <a:srcRect/>
-          <a:stretch>
-            <a:fillRect/>
-          </a:stretch>
-        </p:blipFill>
-        <p:spPr bwMode="auto">
-          <a:xfrm>
-            <a:off x="1912224" y="1656225"/>
-            <a:ext cx="8921070" cy="4871111"/>
-          </a:xfrm>
-          <a:prstGeom prst="rect">
-            <a:avLst/>
-          </a:prstGeom>
-          <a:noFill/>
-          <a:extLst>
-            <a:ext uri="{909E8E84-426E-40DD-AFC4-6F175D3DCCD1}">
-              <a14:hiddenFill xmlns:a14="http://schemas.microsoft.com/office/drawing/2010/main">
-                <a:solidFill>
-                  <a:srgbClr val="FFFFFF"/>
-                </a:solidFill>
-              </a14:hiddenFill>
-            </a:ext>
-          </a:extLst>
-        </p:spPr>
-      </p:pic>
+          <p:cNvGraphicFramePr/>
+          <p:nvPr>
+            <p:extLst>
+              <p:ext uri="{D42A27DB-BD31-4B8C-83A1-F6EECF244321}">
+                <p14:modId xmlns:p14="http://schemas.microsoft.com/office/powerpoint/2010/main" val="1565442214"/>
+              </p:ext>
+            </p:extLst>
+          </p:nvPr>
+        </p:nvGraphicFramePr>
+        <p:xfrm>
+          <a:off x="4905052" y="750440"/>
+          <a:ext cx="6666833" cy="5453920"/>
+        </p:xfrm>
+        <a:graphic>
+          <a:graphicData uri="http://schemas.openxmlformats.org/drawingml/2006/diagram">
+            <dgm:relIds xmlns:dgm="http://schemas.openxmlformats.org/drawingml/2006/diagram" xmlns:r="http://schemas.openxmlformats.org/officeDocument/2006/relationships" r:dm="rId2" r:lo="rId3" r:qs="rId4" r:cs="rId5"/>
+          </a:graphicData>
+        </a:graphic>
+      </p:graphicFrame>
     </p:spTree>
     <p:extLst>
       <p:ext uri="{BB962C8B-B14F-4D97-AF65-F5344CB8AC3E}">
-        <p14:creationId xmlns:p14="http://schemas.microsoft.com/office/powerpoint/2010/main" val="2831567764"/>
+        <p14:creationId xmlns:p14="http://schemas.microsoft.com/office/powerpoint/2010/main" val="1928563026"/>
       </p:ext>
     </p:extLst>
   </p:cSld>

</xml_diff>